<commit_message>
last little fixes of idiotic myself
</commit_message>
<xml_diff>
--- a/Gruppo10_Silva.pptx
+++ b/Gruppo10_Silva.pptx
@@ -371,7 +371,7 @@
           <a:p>
             <a:fld id="{8EA6C711-4382-4A6E-B0AD-72AFD9EFCB5E}" type="datetimeFigureOut">
               <a:rPr lang="it-IT" smtClean="0"/>
-              <a:t>30/08/2020</a:t>
+              <a:t>22/09/2020</a:t>
             </a:fld>
             <a:endParaRPr lang="it-IT"/>
           </a:p>
@@ -705,7 +705,7 @@
           <a:p>
             <a:fld id="{8EA6C711-4382-4A6E-B0AD-72AFD9EFCB5E}" type="datetimeFigureOut">
               <a:rPr lang="it-IT" smtClean="0"/>
-              <a:t>30/08/2020</a:t>
+              <a:t>22/09/2020</a:t>
             </a:fld>
             <a:endParaRPr lang="it-IT"/>
           </a:p>
@@ -983,7 +983,7 @@
           <a:p>
             <a:fld id="{8EA6C711-4382-4A6E-B0AD-72AFD9EFCB5E}" type="datetimeFigureOut">
               <a:rPr lang="it-IT" smtClean="0"/>
-              <a:t>30/08/2020</a:t>
+              <a:t>22/09/2020</a:t>
             </a:fld>
             <a:endParaRPr lang="it-IT"/>
           </a:p>
@@ -1551,7 +1551,7 @@
           <a:p>
             <a:fld id="{8EA6C711-4382-4A6E-B0AD-72AFD9EFCB5E}" type="datetimeFigureOut">
               <a:rPr lang="it-IT" smtClean="0"/>
-              <a:t>30/08/2020</a:t>
+              <a:t>22/09/2020</a:t>
             </a:fld>
             <a:endParaRPr lang="it-IT"/>
           </a:p>
@@ -1829,7 +1829,7 @@
           <a:p>
             <a:fld id="{8EA6C711-4382-4A6E-B0AD-72AFD9EFCB5E}" type="datetimeFigureOut">
               <a:rPr lang="it-IT" smtClean="0"/>
-              <a:t>30/08/2020</a:t>
+              <a:t>22/09/2020</a:t>
             </a:fld>
             <a:endParaRPr lang="it-IT"/>
           </a:p>
@@ -2391,7 +2391,7 @@
           <a:p>
             <a:fld id="{8EA6C711-4382-4A6E-B0AD-72AFD9EFCB5E}" type="datetimeFigureOut">
               <a:rPr lang="it-IT" smtClean="0"/>
-              <a:t>30/08/2020</a:t>
+              <a:t>22/09/2020</a:t>
             </a:fld>
             <a:endParaRPr lang="it-IT"/>
           </a:p>
@@ -2718,7 +2718,7 @@
           <a:p>
             <a:fld id="{8EA6C711-4382-4A6E-B0AD-72AFD9EFCB5E}" type="datetimeFigureOut">
               <a:rPr lang="it-IT" smtClean="0"/>
-              <a:t>30/08/2020</a:t>
+              <a:t>22/09/2020</a:t>
             </a:fld>
             <a:endParaRPr lang="it-IT"/>
           </a:p>
@@ -2923,7 +2923,7 @@
           <a:p>
             <a:fld id="{8EA6C711-4382-4A6E-B0AD-72AFD9EFCB5E}" type="datetimeFigureOut">
               <a:rPr lang="it-IT" smtClean="0"/>
-              <a:t>30/08/2020</a:t>
+              <a:t>22/09/2020</a:t>
             </a:fld>
             <a:endParaRPr lang="it-IT"/>
           </a:p>
@@ -3133,7 +3133,7 @@
           <a:p>
             <a:fld id="{8EA6C711-4382-4A6E-B0AD-72AFD9EFCB5E}" type="datetimeFigureOut">
               <a:rPr lang="it-IT" smtClean="0"/>
-              <a:t>30/08/2020</a:t>
+              <a:t>22/09/2020</a:t>
             </a:fld>
             <a:endParaRPr lang="it-IT"/>
           </a:p>
@@ -3333,7 +3333,7 @@
           <a:p>
             <a:fld id="{8EA6C711-4382-4A6E-B0AD-72AFD9EFCB5E}" type="datetimeFigureOut">
               <a:rPr lang="it-IT" smtClean="0"/>
-              <a:t>30/08/2020</a:t>
+              <a:t>22/09/2020</a:t>
             </a:fld>
             <a:endParaRPr lang="it-IT"/>
           </a:p>
@@ -3609,7 +3609,7 @@
           <a:p>
             <a:fld id="{8EA6C711-4382-4A6E-B0AD-72AFD9EFCB5E}" type="datetimeFigureOut">
               <a:rPr lang="it-IT" smtClean="0"/>
-              <a:t>30/08/2020</a:t>
+              <a:t>22/09/2020</a:t>
             </a:fld>
             <a:endParaRPr lang="it-IT"/>
           </a:p>
@@ -3875,7 +3875,7 @@
           <a:p>
             <a:fld id="{8EA6C711-4382-4A6E-B0AD-72AFD9EFCB5E}" type="datetimeFigureOut">
               <a:rPr lang="it-IT" smtClean="0"/>
-              <a:t>30/08/2020</a:t>
+              <a:t>22/09/2020</a:t>
             </a:fld>
             <a:endParaRPr lang="it-IT"/>
           </a:p>
@@ -4249,7 +4249,7 @@
           <a:p>
             <a:fld id="{8EA6C711-4382-4A6E-B0AD-72AFD9EFCB5E}" type="datetimeFigureOut">
               <a:rPr lang="it-IT" smtClean="0"/>
-              <a:t>30/08/2020</a:t>
+              <a:t>22/09/2020</a:t>
             </a:fld>
             <a:endParaRPr lang="it-IT"/>
           </a:p>
@@ -4397,7 +4397,7 @@
           <a:p>
             <a:fld id="{8EA6C711-4382-4A6E-B0AD-72AFD9EFCB5E}" type="datetimeFigureOut">
               <a:rPr lang="it-IT" smtClean="0"/>
-              <a:t>30/08/2020</a:t>
+              <a:t>22/09/2020</a:t>
             </a:fld>
             <a:endParaRPr lang="it-IT"/>
           </a:p>
@@ -4522,7 +4522,7 @@
           <a:p>
             <a:fld id="{8EA6C711-4382-4A6E-B0AD-72AFD9EFCB5E}" type="datetimeFigureOut">
               <a:rPr lang="it-IT" smtClean="0"/>
-              <a:t>30/08/2020</a:t>
+              <a:t>22/09/2020</a:t>
             </a:fld>
             <a:endParaRPr lang="it-IT"/>
           </a:p>
@@ -4807,7 +4807,7 @@
           <a:p>
             <a:fld id="{8EA6C711-4382-4A6E-B0AD-72AFD9EFCB5E}" type="datetimeFigureOut">
               <a:rPr lang="it-IT" smtClean="0"/>
-              <a:t>30/08/2020</a:t>
+              <a:t>22/09/2020</a:t>
             </a:fld>
             <a:endParaRPr lang="it-IT"/>
           </a:p>
@@ -5131,7 +5131,7 @@
           <a:p>
             <a:fld id="{8EA6C711-4382-4A6E-B0AD-72AFD9EFCB5E}" type="datetimeFigureOut">
               <a:rPr lang="it-IT" smtClean="0"/>
-              <a:t>30/08/2020</a:t>
+              <a:t>22/09/2020</a:t>
             </a:fld>
             <a:endParaRPr lang="it-IT"/>
           </a:p>
@@ -5345,7 +5345,7 @@
           <a:p>
             <a:fld id="{8EA6C711-4382-4A6E-B0AD-72AFD9EFCB5E}" type="datetimeFigureOut">
               <a:rPr lang="it-IT" smtClean="0"/>
-              <a:t>30/08/2020</a:t>
+              <a:t>22/09/2020</a:t>
             </a:fld>
             <a:endParaRPr lang="it-IT"/>
           </a:p>
@@ -8222,14 +8222,14 @@
           <p:nvPr>
             <p:extLst>
               <p:ext uri="{D42A27DB-BD31-4B8C-83A1-F6EECF244321}">
-                <p14:modId xmlns:p14="http://schemas.microsoft.com/office/powerpoint/2010/main" val="3001820213"/>
+                <p14:modId xmlns:p14="http://schemas.microsoft.com/office/powerpoint/2010/main" val="2662078490"/>
               </p:ext>
             </p:extLst>
           </p:nvPr>
         </p:nvGraphicFramePr>
         <p:xfrm>
           <a:off x="6096000" y="2065867"/>
-          <a:ext cx="6096000" cy="4680820"/>
+          <a:ext cx="6096000" cy="4453180"/>
         </p:xfrm>
         <a:graphic>
           <a:graphicData uri="http://schemas.openxmlformats.org/drawingml/2006/table">
@@ -8238,14 +8238,14 @@
                 <a:tableStyleId>{5C22544A-7EE6-4342-B048-85BDC9FD1C3A}</a:tableStyleId>
               </a:tblPr>
               <a:tblGrid>
-                <a:gridCol w="1577419">
+                <a:gridCol w="1705583">
                   <a:extLst>
                     <a:ext uri="{9D8B030D-6E8A-4147-A177-3AD203B41FA5}">
                       <a16:colId xmlns:a16="http://schemas.microsoft.com/office/drawing/2014/main" val="1215356185"/>
                     </a:ext>
                   </a:extLst>
                 </a:gridCol>
-                <a:gridCol w="2092750">
+                <a:gridCol w="1964586">
                   <a:extLst>
                     <a:ext uri="{9D8B030D-6E8A-4147-A177-3AD203B41FA5}">
                       <a16:colId xmlns:a16="http://schemas.microsoft.com/office/drawing/2014/main" val="3810893644"/>
@@ -8279,7 +8279,11 @@
                       <a:endParaRPr lang="it-IT" dirty="0"/>
                     </a:p>
                   </a:txBody>
-                  <a:tcPr/>
+                  <a:tcPr>
+                    <a:solidFill>
+                      <a:srgbClr val="00B050"/>
+                    </a:solidFill>
+                  </a:tcPr>
                 </a:tc>
                 <a:tc>
                   <a:txBody>
@@ -8293,7 +8297,11 @@
                       <a:endParaRPr lang="it-IT" dirty="0"/>
                     </a:p>
                   </a:txBody>
-                  <a:tcPr/>
+                  <a:tcPr>
+                    <a:solidFill>
+                      <a:srgbClr val="00B050"/>
+                    </a:solidFill>
+                  </a:tcPr>
                 </a:tc>
                 <a:tc>
                   <a:txBody>
@@ -8307,7 +8315,11 @@
                       <a:endParaRPr lang="it-IT" dirty="0"/>
                     </a:p>
                   </a:txBody>
-                  <a:tcPr/>
+                  <a:tcPr>
+                    <a:solidFill>
+                      <a:srgbClr val="00B050"/>
+                    </a:solidFill>
+                  </a:tcPr>
                 </a:tc>
                 <a:extLst>
                   <a:ext uri="{0D108BD9-81ED-4DB2-BD59-A6C34878D82A}">
@@ -8328,7 +8340,32 @@
                       <a:endParaRPr lang="it-IT" dirty="0"/>
                     </a:p>
                   </a:txBody>
-                  <a:tcPr/>
+                  <a:tcPr>
+                    <a:gradFill flip="none" rotWithShape="1">
+                      <a:gsLst>
+                        <a:gs pos="0">
+                          <a:schemeClr val="accent1">
+                            <a:shade val="30000"/>
+                            <a:satMod val="115000"/>
+                          </a:schemeClr>
+                        </a:gs>
+                        <a:gs pos="50000">
+                          <a:schemeClr val="accent1">
+                            <a:shade val="67500"/>
+                            <a:satMod val="115000"/>
+                          </a:schemeClr>
+                        </a:gs>
+                        <a:gs pos="100000">
+                          <a:schemeClr val="accent1">
+                            <a:shade val="100000"/>
+                            <a:satMod val="115000"/>
+                          </a:schemeClr>
+                        </a:gs>
+                      </a:gsLst>
+                      <a:lin ang="10800000" scaled="1"/>
+                      <a:tileRect/>
+                    </a:gradFill>
+                  </a:tcPr>
                 </a:tc>
                 <a:tc>
                   <a:txBody>
@@ -8348,7 +8385,32 @@
                       <a:endParaRPr lang="it-IT" dirty="0"/>
                     </a:p>
                   </a:txBody>
-                  <a:tcPr/>
+                  <a:tcPr>
+                    <a:gradFill flip="none" rotWithShape="1">
+                      <a:gsLst>
+                        <a:gs pos="0">
+                          <a:schemeClr val="accent1">
+                            <a:shade val="30000"/>
+                            <a:satMod val="115000"/>
+                          </a:schemeClr>
+                        </a:gs>
+                        <a:gs pos="50000">
+                          <a:schemeClr val="accent1">
+                            <a:shade val="67500"/>
+                            <a:satMod val="115000"/>
+                          </a:schemeClr>
+                        </a:gs>
+                        <a:gs pos="100000">
+                          <a:schemeClr val="accent1">
+                            <a:shade val="100000"/>
+                            <a:satMod val="115000"/>
+                          </a:schemeClr>
+                        </a:gs>
+                      </a:gsLst>
+                      <a:lin ang="10800000" scaled="1"/>
+                      <a:tileRect/>
+                    </a:gradFill>
+                  </a:tcPr>
                 </a:tc>
                 <a:tc>
                   <a:txBody>
@@ -8371,7 +8433,32 @@
                       <a:endParaRPr lang="it-IT" dirty="0"/>
                     </a:p>
                   </a:txBody>
-                  <a:tcPr/>
+                  <a:tcPr>
+                    <a:gradFill flip="none" rotWithShape="1">
+                      <a:gsLst>
+                        <a:gs pos="0">
+                          <a:schemeClr val="accent1">
+                            <a:shade val="30000"/>
+                            <a:satMod val="115000"/>
+                          </a:schemeClr>
+                        </a:gs>
+                        <a:gs pos="50000">
+                          <a:schemeClr val="accent1">
+                            <a:shade val="67500"/>
+                            <a:satMod val="115000"/>
+                          </a:schemeClr>
+                        </a:gs>
+                        <a:gs pos="100000">
+                          <a:schemeClr val="accent1">
+                            <a:shade val="100000"/>
+                            <a:satMod val="115000"/>
+                          </a:schemeClr>
+                        </a:gs>
+                      </a:gsLst>
+                      <a:lin ang="10800000" scaled="1"/>
+                      <a:tileRect/>
+                    </a:gradFill>
+                  </a:tcPr>
                 </a:tc>
                 <a:extLst>
                   <a:ext uri="{0D108BD9-81ED-4DB2-BD59-A6C34878D82A}">
@@ -8392,7 +8479,32 @@
                       <a:endParaRPr lang="it-IT" dirty="0"/>
                     </a:p>
                   </a:txBody>
-                  <a:tcPr/>
+                  <a:tcPr>
+                    <a:gradFill flip="none" rotWithShape="1">
+                      <a:gsLst>
+                        <a:gs pos="0">
+                          <a:schemeClr val="accent1">
+                            <a:shade val="30000"/>
+                            <a:satMod val="115000"/>
+                          </a:schemeClr>
+                        </a:gs>
+                        <a:gs pos="50000">
+                          <a:schemeClr val="accent1">
+                            <a:shade val="67500"/>
+                            <a:satMod val="115000"/>
+                          </a:schemeClr>
+                        </a:gs>
+                        <a:gs pos="100000">
+                          <a:schemeClr val="accent1">
+                            <a:shade val="100000"/>
+                            <a:satMod val="115000"/>
+                          </a:schemeClr>
+                        </a:gs>
+                      </a:gsLst>
+                      <a:lin ang="10800000" scaled="1"/>
+                      <a:tileRect/>
+                    </a:gradFill>
+                  </a:tcPr>
                 </a:tc>
                 <a:tc>
                   <a:txBody>
@@ -8415,7 +8527,32 @@
                       <a:endParaRPr lang="it-IT" dirty="0"/>
                     </a:p>
                   </a:txBody>
-                  <a:tcPr/>
+                  <a:tcPr>
+                    <a:gradFill flip="none" rotWithShape="1">
+                      <a:gsLst>
+                        <a:gs pos="0">
+                          <a:schemeClr val="accent1">
+                            <a:shade val="30000"/>
+                            <a:satMod val="115000"/>
+                          </a:schemeClr>
+                        </a:gs>
+                        <a:gs pos="50000">
+                          <a:schemeClr val="accent1">
+                            <a:shade val="67500"/>
+                            <a:satMod val="115000"/>
+                          </a:schemeClr>
+                        </a:gs>
+                        <a:gs pos="100000">
+                          <a:schemeClr val="accent1">
+                            <a:shade val="100000"/>
+                            <a:satMod val="115000"/>
+                          </a:schemeClr>
+                        </a:gs>
+                      </a:gsLst>
+                      <a:lin ang="10800000" scaled="1"/>
+                      <a:tileRect/>
+                    </a:gradFill>
+                  </a:tcPr>
                 </a:tc>
                 <a:tc>
                   <a:txBody>
@@ -8438,7 +8575,32 @@
                       <a:endParaRPr lang="it-IT" dirty="0"/>
                     </a:p>
                   </a:txBody>
-                  <a:tcPr/>
+                  <a:tcPr>
+                    <a:gradFill flip="none" rotWithShape="1">
+                      <a:gsLst>
+                        <a:gs pos="0">
+                          <a:schemeClr val="accent1">
+                            <a:shade val="30000"/>
+                            <a:satMod val="115000"/>
+                          </a:schemeClr>
+                        </a:gs>
+                        <a:gs pos="50000">
+                          <a:schemeClr val="accent1">
+                            <a:shade val="67500"/>
+                            <a:satMod val="115000"/>
+                          </a:schemeClr>
+                        </a:gs>
+                        <a:gs pos="100000">
+                          <a:schemeClr val="accent1">
+                            <a:shade val="100000"/>
+                            <a:satMod val="115000"/>
+                          </a:schemeClr>
+                        </a:gs>
+                      </a:gsLst>
+                      <a:lin ang="10800000" scaled="1"/>
+                      <a:tileRect/>
+                    </a:gradFill>
+                  </a:tcPr>
                 </a:tc>
                 <a:extLst>
                   <a:ext uri="{0D108BD9-81ED-4DB2-BD59-A6C34878D82A}">
@@ -8459,7 +8621,32 @@
                       <a:endParaRPr lang="it-IT" dirty="0"/>
                     </a:p>
                   </a:txBody>
-                  <a:tcPr/>
+                  <a:tcPr>
+                    <a:gradFill flip="none" rotWithShape="1">
+                      <a:gsLst>
+                        <a:gs pos="0">
+                          <a:schemeClr val="accent1">
+                            <a:shade val="30000"/>
+                            <a:satMod val="115000"/>
+                          </a:schemeClr>
+                        </a:gs>
+                        <a:gs pos="50000">
+                          <a:schemeClr val="accent1">
+                            <a:shade val="67500"/>
+                            <a:satMod val="115000"/>
+                          </a:schemeClr>
+                        </a:gs>
+                        <a:gs pos="100000">
+                          <a:schemeClr val="accent1">
+                            <a:shade val="100000"/>
+                            <a:satMod val="115000"/>
+                          </a:schemeClr>
+                        </a:gs>
+                      </a:gsLst>
+                      <a:lin ang="10800000" scaled="1"/>
+                      <a:tileRect/>
+                    </a:gradFill>
+                  </a:tcPr>
                 </a:tc>
                 <a:tc>
                   <a:txBody>
@@ -8482,7 +8669,32 @@
                       <a:endParaRPr lang="it-IT" dirty="0"/>
                     </a:p>
                   </a:txBody>
-                  <a:tcPr/>
+                  <a:tcPr>
+                    <a:gradFill flip="none" rotWithShape="1">
+                      <a:gsLst>
+                        <a:gs pos="0">
+                          <a:schemeClr val="accent1">
+                            <a:shade val="30000"/>
+                            <a:satMod val="115000"/>
+                          </a:schemeClr>
+                        </a:gs>
+                        <a:gs pos="50000">
+                          <a:schemeClr val="accent1">
+                            <a:shade val="67500"/>
+                            <a:satMod val="115000"/>
+                          </a:schemeClr>
+                        </a:gs>
+                        <a:gs pos="100000">
+                          <a:schemeClr val="accent1">
+                            <a:shade val="100000"/>
+                            <a:satMod val="115000"/>
+                          </a:schemeClr>
+                        </a:gs>
+                      </a:gsLst>
+                      <a:lin ang="10800000" scaled="1"/>
+                      <a:tileRect/>
+                    </a:gradFill>
+                  </a:tcPr>
                 </a:tc>
                 <a:tc>
                   <a:txBody>
@@ -8505,7 +8717,32 @@
                       <a:endParaRPr lang="it-IT" dirty="0"/>
                     </a:p>
                   </a:txBody>
-                  <a:tcPr/>
+                  <a:tcPr>
+                    <a:gradFill flip="none" rotWithShape="1">
+                      <a:gsLst>
+                        <a:gs pos="0">
+                          <a:schemeClr val="accent1">
+                            <a:shade val="30000"/>
+                            <a:satMod val="115000"/>
+                          </a:schemeClr>
+                        </a:gs>
+                        <a:gs pos="50000">
+                          <a:schemeClr val="accent1">
+                            <a:shade val="67500"/>
+                            <a:satMod val="115000"/>
+                          </a:schemeClr>
+                        </a:gs>
+                        <a:gs pos="100000">
+                          <a:schemeClr val="accent1">
+                            <a:shade val="100000"/>
+                            <a:satMod val="115000"/>
+                          </a:schemeClr>
+                        </a:gs>
+                      </a:gsLst>
+                      <a:lin ang="10800000" scaled="1"/>
+                      <a:tileRect/>
+                    </a:gradFill>
+                  </a:tcPr>
                 </a:tc>
                 <a:extLst>
                   <a:ext uri="{0D108BD9-81ED-4DB2-BD59-A6C34878D82A}">
@@ -8526,7 +8763,32 @@
                       <a:endParaRPr lang="it-IT" dirty="0"/>
                     </a:p>
                   </a:txBody>
-                  <a:tcPr/>
+                  <a:tcPr>
+                    <a:gradFill flip="none" rotWithShape="1">
+                      <a:gsLst>
+                        <a:gs pos="0">
+                          <a:schemeClr val="accent1">
+                            <a:shade val="30000"/>
+                            <a:satMod val="115000"/>
+                          </a:schemeClr>
+                        </a:gs>
+                        <a:gs pos="50000">
+                          <a:schemeClr val="accent1">
+                            <a:shade val="67500"/>
+                            <a:satMod val="115000"/>
+                          </a:schemeClr>
+                        </a:gs>
+                        <a:gs pos="100000">
+                          <a:schemeClr val="accent1">
+                            <a:shade val="100000"/>
+                            <a:satMod val="115000"/>
+                          </a:schemeClr>
+                        </a:gs>
+                      </a:gsLst>
+                      <a:lin ang="10800000" scaled="1"/>
+                      <a:tileRect/>
+                    </a:gradFill>
+                  </a:tcPr>
                 </a:tc>
                 <a:tc>
                   <a:txBody>
@@ -8549,7 +8811,32 @@
                       <a:endParaRPr lang="it-IT" dirty="0"/>
                     </a:p>
                   </a:txBody>
-                  <a:tcPr/>
+                  <a:tcPr>
+                    <a:gradFill flip="none" rotWithShape="1">
+                      <a:gsLst>
+                        <a:gs pos="0">
+                          <a:schemeClr val="accent1">
+                            <a:shade val="30000"/>
+                            <a:satMod val="115000"/>
+                          </a:schemeClr>
+                        </a:gs>
+                        <a:gs pos="50000">
+                          <a:schemeClr val="accent1">
+                            <a:shade val="67500"/>
+                            <a:satMod val="115000"/>
+                          </a:schemeClr>
+                        </a:gs>
+                        <a:gs pos="100000">
+                          <a:schemeClr val="accent1">
+                            <a:shade val="100000"/>
+                            <a:satMod val="115000"/>
+                          </a:schemeClr>
+                        </a:gs>
+                      </a:gsLst>
+                      <a:lin ang="10800000" scaled="1"/>
+                      <a:tileRect/>
+                    </a:gradFill>
+                  </a:tcPr>
                 </a:tc>
                 <a:tc>
                   <a:txBody>
@@ -8572,7 +8859,32 @@
                       <a:endParaRPr lang="it-IT" dirty="0"/>
                     </a:p>
                   </a:txBody>
-                  <a:tcPr/>
+                  <a:tcPr>
+                    <a:gradFill flip="none" rotWithShape="1">
+                      <a:gsLst>
+                        <a:gs pos="0">
+                          <a:schemeClr val="accent1">
+                            <a:shade val="30000"/>
+                            <a:satMod val="115000"/>
+                          </a:schemeClr>
+                        </a:gs>
+                        <a:gs pos="50000">
+                          <a:schemeClr val="accent1">
+                            <a:shade val="67500"/>
+                            <a:satMod val="115000"/>
+                          </a:schemeClr>
+                        </a:gs>
+                        <a:gs pos="100000">
+                          <a:schemeClr val="accent1">
+                            <a:shade val="100000"/>
+                            <a:satMod val="115000"/>
+                          </a:schemeClr>
+                        </a:gs>
+                      </a:gsLst>
+                      <a:lin ang="10800000" scaled="1"/>
+                      <a:tileRect/>
+                    </a:gradFill>
+                  </a:tcPr>
                 </a:tc>
                 <a:extLst>
                   <a:ext uri="{0D108BD9-81ED-4DB2-BD59-A6C34878D82A}">
@@ -11070,7 +11382,7 @@
         </p:spPr>
         <p:txBody>
           <a:bodyPr>
-            <a:normAutofit/>
+            <a:normAutofit fontScale="92500" lnSpcReduction="10000"/>
           </a:bodyPr>
           <a:lstStyle/>
           <a:p>
@@ -11083,8 +11395,10 @@
             </a:r>
             <a:r>
               <a:rPr lang="it-IT" sz="2400" dirty="0"/>
-              <a:t> ▪ </a:t>
-            </a:r>
+              <a:t> </a:t>
+            </a:r>
+          </a:p>
+          <a:p>
             <a:r>
               <a:rPr lang="it-IT" sz="2400" dirty="0" err="1"/>
               <a:t>Specifications</a:t>
@@ -11238,7 +11552,7 @@
         <p:spPr>
           <a:xfrm>
             <a:off x="480194" y="2828835"/>
-            <a:ext cx="11231612" cy="2862322"/>
+            <a:ext cx="11231612" cy="3693319"/>
           </a:xfrm>
           <a:prstGeom prst="rect">
             <a:avLst/>
@@ -11354,11 +11668,11 @@
             </a:pPr>
             <a:r>
               <a:rPr lang="it-IT" dirty="0" err="1"/>
-              <a:t>Starting</a:t>
+              <a:t>Each</a:t>
             </a:r>
             <a:r>
               <a:rPr lang="it-IT" dirty="0"/>
-              <a:t> by the top-</a:t>
+              <a:t> component in the top-</a:t>
             </a:r>
             <a:r>
               <a:rPr lang="it-IT" dirty="0" err="1"/>
@@ -11382,15 +11696,7 @@
             </a:r>
             <a:r>
               <a:rPr lang="it-IT" dirty="0"/>
-              <a:t>, </a:t>
-            </a:r>
-            <a:r>
-              <a:rPr lang="it-IT" dirty="0" err="1"/>
-              <a:t>each</a:t>
-            </a:r>
-            <a:r>
-              <a:rPr lang="it-IT" dirty="0"/>
-              <a:t> component </a:t>
+              <a:t> </a:t>
             </a:r>
             <a:r>
               <a:rPr lang="it-IT" dirty="0" err="1"/>
@@ -11497,6 +11803,192 @@
             <a:r>
               <a:rPr lang="it-IT" dirty="0" err="1"/>
               <a:t>connected</a:t>
+            </a:r>
+            <a:r>
+              <a:rPr lang="it-IT" dirty="0"/>
+              <a:t>, the </a:t>
+            </a:r>
+            <a:r>
+              <a:rPr lang="en-US" b="1" dirty="0"/>
+              <a:t>Simulation results</a:t>
+            </a:r>
+            <a:r>
+              <a:rPr lang="it-IT" b="1" dirty="0"/>
+              <a:t> </a:t>
+            </a:r>
+            <a:r>
+              <a:rPr lang="it-IT" dirty="0" err="1"/>
+              <a:t>section</a:t>
+            </a:r>
+            <a:r>
+              <a:rPr lang="it-IT" dirty="0"/>
+              <a:t> include the test of </a:t>
+            </a:r>
+            <a:r>
+              <a:rPr lang="it-IT" dirty="0" err="1"/>
+              <a:t>all</a:t>
+            </a:r>
+            <a:r>
+              <a:rPr lang="it-IT" dirty="0"/>
+              <a:t> </a:t>
+            </a:r>
+            <a:r>
+              <a:rPr lang="it-IT" dirty="0" err="1"/>
+              <a:t>components</a:t>
+            </a:r>
+            <a:r>
+              <a:rPr lang="it-IT" dirty="0"/>
+              <a:t> </a:t>
+            </a:r>
+            <a:r>
+              <a:rPr lang="it-IT" dirty="0" err="1"/>
+              <a:t>connected</a:t>
+            </a:r>
+            <a:r>
+              <a:rPr lang="it-IT" dirty="0"/>
+              <a:t>.</a:t>
+            </a:r>
+          </a:p>
+          <a:p>
+            <a:pPr marL="285750" indent="-285750">
+              <a:buFont typeface="Arial" panose="020B0604020202020204" pitchFamily="34" charset="0"/>
+              <a:buChar char="•"/>
+            </a:pPr>
+            <a:r>
+              <a:rPr lang="it-IT" dirty="0" err="1"/>
+              <a:t>Since</a:t>
+            </a:r>
+            <a:r>
+              <a:rPr lang="it-IT" dirty="0"/>
+              <a:t> </a:t>
+            </a:r>
+            <a:r>
+              <a:rPr lang="it-IT" dirty="0" err="1"/>
+              <a:t>nowere</a:t>
+            </a:r>
+            <a:r>
+              <a:rPr lang="it-IT" dirty="0"/>
+              <a:t> </a:t>
+            </a:r>
+            <a:r>
+              <a:rPr lang="it-IT" dirty="0" err="1"/>
+              <a:t>was</a:t>
+            </a:r>
+            <a:r>
+              <a:rPr lang="it-IT" dirty="0"/>
+              <a:t> </a:t>
+            </a:r>
+            <a:r>
+              <a:rPr lang="it-IT" dirty="0" err="1"/>
+              <a:t>written</a:t>
+            </a:r>
+            <a:r>
+              <a:rPr lang="it-IT" dirty="0"/>
+              <a:t> </a:t>
+            </a:r>
+            <a:r>
+              <a:rPr lang="it-IT" dirty="0" err="1"/>
+              <a:t>that</a:t>
+            </a:r>
+            <a:r>
+              <a:rPr lang="it-IT" dirty="0"/>
+              <a:t> the counter </a:t>
+            </a:r>
+            <a:r>
+              <a:rPr lang="it-IT" dirty="0" err="1"/>
+              <a:t>has</a:t>
+            </a:r>
+            <a:r>
+              <a:rPr lang="it-IT" dirty="0"/>
+              <a:t> to reset </a:t>
+            </a:r>
+            <a:r>
+              <a:rPr lang="it-IT" dirty="0" err="1"/>
+              <a:t>when</a:t>
+            </a:r>
+            <a:r>
+              <a:rPr lang="it-IT" dirty="0"/>
+              <a:t> mode </a:t>
+            </a:r>
+            <a:r>
+              <a:rPr lang="it-IT" dirty="0" err="1"/>
+              <a:t>function</a:t>
+            </a:r>
+            <a:r>
+              <a:rPr lang="it-IT" dirty="0"/>
+              <a:t> </a:t>
+            </a:r>
+            <a:r>
+              <a:rPr lang="it-IT" dirty="0" err="1"/>
+              <a:t>change</a:t>
+            </a:r>
+            <a:r>
+              <a:rPr lang="it-IT" dirty="0"/>
+              <a:t>, I </a:t>
+            </a:r>
+            <a:r>
+              <a:rPr lang="it-IT" dirty="0" err="1"/>
+              <a:t>opted</a:t>
+            </a:r>
+            <a:r>
+              <a:rPr lang="it-IT" dirty="0"/>
+              <a:t> to take </a:t>
+            </a:r>
+            <a:r>
+              <a:rPr lang="it-IT" dirty="0" err="1"/>
+              <a:t>all</a:t>
+            </a:r>
+            <a:r>
+              <a:rPr lang="it-IT" dirty="0"/>
+              <a:t> the 3 </a:t>
+            </a:r>
+            <a:r>
+              <a:rPr lang="it-IT" dirty="0" err="1"/>
+              <a:t>circuits</a:t>
+            </a:r>
+            <a:r>
+              <a:rPr lang="it-IT" dirty="0"/>
+              <a:t>(</a:t>
+            </a:r>
+            <a:r>
+              <a:rPr lang="it-IT" dirty="0" err="1"/>
+              <a:t>MODn</a:t>
+            </a:r>
+            <a:r>
+              <a:rPr lang="it-IT"/>
+              <a:t>) </a:t>
+            </a:r>
+            <a:r>
+              <a:rPr lang="it-IT" dirty="0"/>
+              <a:t>running and </a:t>
+            </a:r>
+            <a:r>
+              <a:rPr lang="it-IT" dirty="0" err="1"/>
+              <a:t>abiltate</a:t>
+            </a:r>
+            <a:r>
+              <a:rPr lang="it-IT" dirty="0"/>
+              <a:t> </a:t>
+            </a:r>
+            <a:r>
+              <a:rPr lang="it-IT" dirty="0" err="1"/>
+              <a:t>only</a:t>
+            </a:r>
+            <a:r>
+              <a:rPr lang="it-IT" dirty="0"/>
+              <a:t> 1 exit </a:t>
+            </a:r>
+            <a:r>
+              <a:rPr lang="it-IT" dirty="0" err="1"/>
+              <a:t>corrisponding</a:t>
+            </a:r>
+            <a:r>
+              <a:rPr lang="it-IT" dirty="0"/>
+              <a:t> to the mode-</a:t>
+            </a:r>
+            <a:r>
+              <a:rPr lang="it-IT" dirty="0" err="1"/>
+              <a:t>circuit</a:t>
             </a:r>
             <a:r>
               <a:rPr lang="it-IT" dirty="0"/>
@@ -12093,7 +12585,15 @@
             </a:r>
             <a:r>
               <a:rPr lang="it-IT" dirty="0"/>
-              <a:t> with 3 and 3 </a:t>
+              <a:t> with 3 </a:t>
+            </a:r>
+            <a:r>
+              <a:rPr lang="it-IT" dirty="0" err="1"/>
+              <a:t>lights</a:t>
+            </a:r>
+            <a:r>
+              <a:rPr lang="it-IT" dirty="0"/>
+              <a:t> in output and 3 </a:t>
             </a:r>
             <a:r>
               <a:rPr lang="it-IT" dirty="0" err="1"/>
@@ -12232,11 +12732,11 @@
             </a:r>
             <a:r>
               <a:rPr lang="it-IT" dirty="0"/>
-              <a:t> 1 second in the </a:t>
+              <a:t> 1 second in the FPGA </a:t>
             </a:r>
             <a:r>
               <a:rPr lang="it-IT" dirty="0" err="1"/>
-              <a:t>fpga</a:t>
+              <a:t>has</a:t>
             </a:r>
             <a:r>
               <a:rPr lang="it-IT" dirty="0"/>
@@ -12244,7 +12744,7 @@
             </a:r>
             <a:r>
               <a:rPr lang="it-IT" dirty="0" err="1"/>
-              <a:t>has</a:t>
+              <a:t>been</a:t>
             </a:r>
             <a:r>
               <a:rPr lang="it-IT" dirty="0"/>
@@ -12252,7 +12752,7 @@
             </a:r>
             <a:r>
               <a:rPr lang="it-IT" dirty="0" err="1"/>
-              <a:t>been</a:t>
+              <a:t>converted</a:t>
             </a:r>
             <a:r>
               <a:rPr lang="it-IT" dirty="0"/>
@@ -12260,7 +12760,15 @@
             </a:r>
             <a:r>
               <a:rPr lang="it-IT" dirty="0" err="1"/>
-              <a:t>translated</a:t>
+              <a:t>into</a:t>
+            </a:r>
+            <a:r>
+              <a:rPr lang="it-IT" dirty="0"/>
+              <a:t> 100 ns. </a:t>
+            </a:r>
+            <a:r>
+              <a:rPr lang="it-IT" dirty="0" err="1"/>
+              <a:t>Since</a:t>
             </a:r>
             <a:r>
               <a:rPr lang="it-IT" dirty="0"/>
@@ -12268,15 +12776,15 @@
             </a:r>
             <a:r>
               <a:rPr lang="it-IT" dirty="0" err="1"/>
-              <a:t>as</a:t>
+              <a:t>simulating</a:t>
             </a:r>
             <a:r>
               <a:rPr lang="it-IT" dirty="0"/>
-              <a:t> 100 ns. </a:t>
+              <a:t> a 1 sec with </a:t>
             </a:r>
             <a:r>
               <a:rPr lang="it-IT" dirty="0" err="1"/>
-              <a:t>Since</a:t>
+              <a:t>ModelSim</a:t>
             </a:r>
             <a:r>
               <a:rPr lang="it-IT" dirty="0"/>
@@ -12284,27 +12792,11 @@
             </a:r>
             <a:r>
               <a:rPr lang="it-IT" dirty="0" err="1"/>
-              <a:t>simulating</a:t>
+              <a:t>would</a:t>
             </a:r>
             <a:r>
               <a:rPr lang="it-IT" dirty="0"/>
-              <a:t> a 1 sec with </a:t>
-            </a:r>
-            <a:r>
-              <a:rPr lang="it-IT" dirty="0" err="1"/>
-              <a:t>ModelSim</a:t>
-            </a:r>
-            <a:r>
-              <a:rPr lang="it-IT" dirty="0"/>
-              <a:t> </a:t>
-            </a:r>
-            <a:r>
-              <a:rPr lang="it-IT" dirty="0" err="1"/>
-              <a:t>was</a:t>
-            </a:r>
-            <a:r>
-              <a:rPr lang="it-IT" dirty="0"/>
-              <a:t> </a:t>
+              <a:t> take </a:t>
             </a:r>
             <a:r>
               <a:rPr lang="it-IT" dirty="0" err="1"/>
@@ -12312,15 +12804,7 @@
             </a:r>
             <a:r>
               <a:rPr lang="it-IT" dirty="0"/>
-              <a:t> </a:t>
-            </a:r>
-            <a:r>
-              <a:rPr lang="it-IT" dirty="0" err="1"/>
-              <a:t>expensive</a:t>
-            </a:r>
-            <a:r>
-              <a:rPr lang="it-IT" dirty="0"/>
-              <a:t>.</a:t>
+              <a:t> long.</a:t>
             </a:r>
           </a:p>
         </p:txBody>
@@ -12485,7 +12969,7 @@
             <p:ph idx="1"/>
             <p:extLst>
               <p:ext uri="{D42A27DB-BD31-4B8C-83A1-F6EECF244321}">
-                <p14:modId xmlns:p14="http://schemas.microsoft.com/office/powerpoint/2010/main" val="2545818847"/>
+                <p14:modId xmlns:p14="http://schemas.microsoft.com/office/powerpoint/2010/main" val="3576281283"/>
               </p:ext>
             </p:extLst>
           </p:nvPr>
@@ -12543,7 +13027,11 @@
                       <a:endParaRPr lang="it-IT" dirty="0"/>
                     </a:p>
                   </a:txBody>
-                  <a:tcPr/>
+                  <a:tcPr>
+                    <a:solidFill>
+                      <a:srgbClr val="00B050"/>
+                    </a:solidFill>
+                  </a:tcPr>
                 </a:tc>
                 <a:tc>
                   <a:txBody>
@@ -12557,7 +13045,11 @@
                       <a:endParaRPr lang="it-IT" dirty="0"/>
                     </a:p>
                   </a:txBody>
-                  <a:tcPr/>
+                  <a:tcPr>
+                    <a:solidFill>
+                      <a:srgbClr val="00B050"/>
+                    </a:solidFill>
+                  </a:tcPr>
                 </a:tc>
                 <a:tc>
                   <a:txBody>
@@ -12571,7 +13063,11 @@
                       <a:endParaRPr lang="it-IT" dirty="0"/>
                     </a:p>
                   </a:txBody>
-                  <a:tcPr/>
+                  <a:tcPr>
+                    <a:solidFill>
+                      <a:srgbClr val="00B050"/>
+                    </a:solidFill>
+                  </a:tcPr>
                 </a:tc>
                 <a:tc>
                   <a:txBody>
@@ -12585,7 +13081,11 @@
                       <a:endParaRPr lang="it-IT" dirty="0"/>
                     </a:p>
                   </a:txBody>
-                  <a:tcPr/>
+                  <a:tcPr>
+                    <a:solidFill>
+                      <a:srgbClr val="00B050"/>
+                    </a:solidFill>
+                  </a:tcPr>
                 </a:tc>
                 <a:extLst>
                   <a:ext uri="{0D108BD9-81ED-4DB2-BD59-A6C34878D82A}">
@@ -12606,7 +13106,32 @@
                       <a:endParaRPr lang="it-IT" dirty="0"/>
                     </a:p>
                   </a:txBody>
-                  <a:tcPr/>
+                  <a:tcPr>
+                    <a:gradFill flip="none" rotWithShape="1">
+                      <a:gsLst>
+                        <a:gs pos="0">
+                          <a:schemeClr val="accent1">
+                            <a:shade val="30000"/>
+                            <a:satMod val="115000"/>
+                          </a:schemeClr>
+                        </a:gs>
+                        <a:gs pos="50000">
+                          <a:schemeClr val="accent1">
+                            <a:shade val="67500"/>
+                            <a:satMod val="115000"/>
+                          </a:schemeClr>
+                        </a:gs>
+                        <a:gs pos="100000">
+                          <a:schemeClr val="accent1">
+                            <a:shade val="100000"/>
+                            <a:satMod val="115000"/>
+                          </a:schemeClr>
+                        </a:gs>
+                      </a:gsLst>
+                      <a:lin ang="8100000" scaled="1"/>
+                      <a:tileRect/>
+                    </a:gradFill>
+                  </a:tcPr>
                 </a:tc>
                 <a:tc>
                   <a:txBody>
@@ -12620,7 +13145,32 @@
                       <a:endParaRPr lang="it-IT" dirty="0"/>
                     </a:p>
                   </a:txBody>
-                  <a:tcPr/>
+                  <a:tcPr>
+                    <a:gradFill flip="none" rotWithShape="1">
+                      <a:gsLst>
+                        <a:gs pos="0">
+                          <a:schemeClr val="accent1">
+                            <a:shade val="30000"/>
+                            <a:satMod val="115000"/>
+                          </a:schemeClr>
+                        </a:gs>
+                        <a:gs pos="50000">
+                          <a:schemeClr val="accent1">
+                            <a:shade val="67500"/>
+                            <a:satMod val="115000"/>
+                          </a:schemeClr>
+                        </a:gs>
+                        <a:gs pos="100000">
+                          <a:schemeClr val="accent1">
+                            <a:shade val="100000"/>
+                            <a:satMod val="115000"/>
+                          </a:schemeClr>
+                        </a:gs>
+                      </a:gsLst>
+                      <a:lin ang="8100000" scaled="1"/>
+                      <a:tileRect/>
+                    </a:gradFill>
+                  </a:tcPr>
                 </a:tc>
                 <a:tc>
                   <a:txBody>
@@ -12634,7 +13184,32 @@
                       <a:endParaRPr lang="it-IT" dirty="0"/>
                     </a:p>
                   </a:txBody>
-                  <a:tcPr/>
+                  <a:tcPr>
+                    <a:gradFill flip="none" rotWithShape="1">
+                      <a:gsLst>
+                        <a:gs pos="0">
+                          <a:schemeClr val="accent1">
+                            <a:shade val="30000"/>
+                            <a:satMod val="115000"/>
+                          </a:schemeClr>
+                        </a:gs>
+                        <a:gs pos="50000">
+                          <a:schemeClr val="accent1">
+                            <a:shade val="67500"/>
+                            <a:satMod val="115000"/>
+                          </a:schemeClr>
+                        </a:gs>
+                        <a:gs pos="100000">
+                          <a:schemeClr val="accent1">
+                            <a:shade val="100000"/>
+                            <a:satMod val="115000"/>
+                          </a:schemeClr>
+                        </a:gs>
+                      </a:gsLst>
+                      <a:lin ang="8100000" scaled="1"/>
+                      <a:tileRect/>
+                    </a:gradFill>
+                  </a:tcPr>
                 </a:tc>
                 <a:tc>
                   <a:txBody>
@@ -12648,7 +13223,32 @@
                       <a:endParaRPr lang="it-IT" sz="1600" dirty="0"/>
                     </a:p>
                   </a:txBody>
-                  <a:tcPr/>
+                  <a:tcPr>
+                    <a:gradFill flip="none" rotWithShape="1">
+                      <a:gsLst>
+                        <a:gs pos="0">
+                          <a:schemeClr val="accent1">
+                            <a:shade val="30000"/>
+                            <a:satMod val="115000"/>
+                          </a:schemeClr>
+                        </a:gs>
+                        <a:gs pos="50000">
+                          <a:schemeClr val="accent1">
+                            <a:shade val="67500"/>
+                            <a:satMod val="115000"/>
+                          </a:schemeClr>
+                        </a:gs>
+                        <a:gs pos="100000">
+                          <a:schemeClr val="accent1">
+                            <a:shade val="100000"/>
+                            <a:satMod val="115000"/>
+                          </a:schemeClr>
+                        </a:gs>
+                      </a:gsLst>
+                      <a:lin ang="8100000" scaled="1"/>
+                      <a:tileRect/>
+                    </a:gradFill>
+                  </a:tcPr>
                 </a:tc>
                 <a:extLst>
                   <a:ext uri="{0D108BD9-81ED-4DB2-BD59-A6C34878D82A}">
@@ -12669,7 +13269,32 @@
                       <a:endParaRPr lang="it-IT" dirty="0"/>
                     </a:p>
                   </a:txBody>
-                  <a:tcPr/>
+                  <a:tcPr>
+                    <a:gradFill flip="none" rotWithShape="1">
+                      <a:gsLst>
+                        <a:gs pos="0">
+                          <a:schemeClr val="accent1">
+                            <a:shade val="30000"/>
+                            <a:satMod val="115000"/>
+                          </a:schemeClr>
+                        </a:gs>
+                        <a:gs pos="50000">
+                          <a:schemeClr val="accent1">
+                            <a:shade val="67500"/>
+                            <a:satMod val="115000"/>
+                          </a:schemeClr>
+                        </a:gs>
+                        <a:gs pos="100000">
+                          <a:schemeClr val="accent1">
+                            <a:shade val="100000"/>
+                            <a:satMod val="115000"/>
+                          </a:schemeClr>
+                        </a:gs>
+                      </a:gsLst>
+                      <a:lin ang="8100000" scaled="1"/>
+                      <a:tileRect/>
+                    </a:gradFill>
+                  </a:tcPr>
                 </a:tc>
                 <a:tc>
                   <a:txBody>
@@ -12683,7 +13308,32 @@
                       <a:endParaRPr lang="it-IT" dirty="0"/>
                     </a:p>
                   </a:txBody>
-                  <a:tcPr/>
+                  <a:tcPr>
+                    <a:gradFill flip="none" rotWithShape="1">
+                      <a:gsLst>
+                        <a:gs pos="0">
+                          <a:schemeClr val="accent1">
+                            <a:shade val="30000"/>
+                            <a:satMod val="115000"/>
+                          </a:schemeClr>
+                        </a:gs>
+                        <a:gs pos="50000">
+                          <a:schemeClr val="accent1">
+                            <a:shade val="67500"/>
+                            <a:satMod val="115000"/>
+                          </a:schemeClr>
+                        </a:gs>
+                        <a:gs pos="100000">
+                          <a:schemeClr val="accent1">
+                            <a:shade val="100000"/>
+                            <a:satMod val="115000"/>
+                          </a:schemeClr>
+                        </a:gs>
+                      </a:gsLst>
+                      <a:lin ang="8100000" scaled="1"/>
+                      <a:tileRect/>
+                    </a:gradFill>
+                  </a:tcPr>
                 </a:tc>
                 <a:tc>
                   <a:txBody>
@@ -12697,7 +13347,32 @@
                       <a:endParaRPr lang="it-IT" dirty="0"/>
                     </a:p>
                   </a:txBody>
-                  <a:tcPr/>
+                  <a:tcPr>
+                    <a:gradFill flip="none" rotWithShape="1">
+                      <a:gsLst>
+                        <a:gs pos="0">
+                          <a:schemeClr val="accent1">
+                            <a:shade val="30000"/>
+                            <a:satMod val="115000"/>
+                          </a:schemeClr>
+                        </a:gs>
+                        <a:gs pos="50000">
+                          <a:schemeClr val="accent1">
+                            <a:shade val="67500"/>
+                            <a:satMod val="115000"/>
+                          </a:schemeClr>
+                        </a:gs>
+                        <a:gs pos="100000">
+                          <a:schemeClr val="accent1">
+                            <a:shade val="100000"/>
+                            <a:satMod val="115000"/>
+                          </a:schemeClr>
+                        </a:gs>
+                      </a:gsLst>
+                      <a:lin ang="8100000" scaled="1"/>
+                      <a:tileRect/>
+                    </a:gradFill>
+                  </a:tcPr>
                 </a:tc>
                 <a:tc>
                   <a:txBody>
@@ -12719,7 +13394,32 @@
                       <a:endParaRPr lang="it-IT" sz="1600" dirty="0"/>
                     </a:p>
                   </a:txBody>
-                  <a:tcPr/>
+                  <a:tcPr>
+                    <a:gradFill flip="none" rotWithShape="1">
+                      <a:gsLst>
+                        <a:gs pos="0">
+                          <a:schemeClr val="accent1">
+                            <a:shade val="30000"/>
+                            <a:satMod val="115000"/>
+                          </a:schemeClr>
+                        </a:gs>
+                        <a:gs pos="50000">
+                          <a:schemeClr val="accent1">
+                            <a:shade val="67500"/>
+                            <a:satMod val="115000"/>
+                          </a:schemeClr>
+                        </a:gs>
+                        <a:gs pos="100000">
+                          <a:schemeClr val="accent1">
+                            <a:shade val="100000"/>
+                            <a:satMod val="115000"/>
+                          </a:schemeClr>
+                        </a:gs>
+                      </a:gsLst>
+                      <a:lin ang="8100000" scaled="1"/>
+                      <a:tileRect/>
+                    </a:gradFill>
+                  </a:tcPr>
                 </a:tc>
                 <a:extLst>
                   <a:ext uri="{0D108BD9-81ED-4DB2-BD59-A6C34878D82A}">
@@ -12740,7 +13440,32 @@
                       <a:endParaRPr lang="it-IT" dirty="0"/>
                     </a:p>
                   </a:txBody>
-                  <a:tcPr/>
+                  <a:tcPr>
+                    <a:gradFill flip="none" rotWithShape="1">
+                      <a:gsLst>
+                        <a:gs pos="0">
+                          <a:schemeClr val="accent1">
+                            <a:shade val="30000"/>
+                            <a:satMod val="115000"/>
+                          </a:schemeClr>
+                        </a:gs>
+                        <a:gs pos="50000">
+                          <a:schemeClr val="accent1">
+                            <a:shade val="67500"/>
+                            <a:satMod val="115000"/>
+                          </a:schemeClr>
+                        </a:gs>
+                        <a:gs pos="100000">
+                          <a:schemeClr val="accent1">
+                            <a:shade val="100000"/>
+                            <a:satMod val="115000"/>
+                          </a:schemeClr>
+                        </a:gs>
+                      </a:gsLst>
+                      <a:lin ang="8100000" scaled="1"/>
+                      <a:tileRect/>
+                    </a:gradFill>
+                  </a:tcPr>
                 </a:tc>
                 <a:tc>
                   <a:txBody>
@@ -12754,7 +13479,32 @@
                       <a:endParaRPr lang="it-IT" dirty="0"/>
                     </a:p>
                   </a:txBody>
-                  <a:tcPr/>
+                  <a:tcPr>
+                    <a:gradFill flip="none" rotWithShape="1">
+                      <a:gsLst>
+                        <a:gs pos="0">
+                          <a:schemeClr val="accent1">
+                            <a:shade val="30000"/>
+                            <a:satMod val="115000"/>
+                          </a:schemeClr>
+                        </a:gs>
+                        <a:gs pos="50000">
+                          <a:schemeClr val="accent1">
+                            <a:shade val="67500"/>
+                            <a:satMod val="115000"/>
+                          </a:schemeClr>
+                        </a:gs>
+                        <a:gs pos="100000">
+                          <a:schemeClr val="accent1">
+                            <a:shade val="100000"/>
+                            <a:satMod val="115000"/>
+                          </a:schemeClr>
+                        </a:gs>
+                      </a:gsLst>
+                      <a:lin ang="8100000" scaled="1"/>
+                      <a:tileRect/>
+                    </a:gradFill>
+                  </a:tcPr>
                 </a:tc>
                 <a:tc>
                   <a:txBody>
@@ -12768,7 +13518,32 @@
                       <a:endParaRPr lang="it-IT" dirty="0"/>
                     </a:p>
                   </a:txBody>
-                  <a:tcPr/>
+                  <a:tcPr>
+                    <a:gradFill flip="none" rotWithShape="1">
+                      <a:gsLst>
+                        <a:gs pos="0">
+                          <a:schemeClr val="accent1">
+                            <a:shade val="30000"/>
+                            <a:satMod val="115000"/>
+                          </a:schemeClr>
+                        </a:gs>
+                        <a:gs pos="50000">
+                          <a:schemeClr val="accent1">
+                            <a:shade val="67500"/>
+                            <a:satMod val="115000"/>
+                          </a:schemeClr>
+                        </a:gs>
+                        <a:gs pos="100000">
+                          <a:schemeClr val="accent1">
+                            <a:shade val="100000"/>
+                            <a:satMod val="115000"/>
+                          </a:schemeClr>
+                        </a:gs>
+                      </a:gsLst>
+                      <a:lin ang="8100000" scaled="1"/>
+                      <a:tileRect/>
+                    </a:gradFill>
+                  </a:tcPr>
                 </a:tc>
                 <a:tc>
                   <a:txBody>
@@ -12818,7 +13593,32 @@
                       <a:endParaRPr lang="it-IT" sz="1600" dirty="0"/>
                     </a:p>
                   </a:txBody>
-                  <a:tcPr/>
+                  <a:tcPr>
+                    <a:gradFill flip="none" rotWithShape="1">
+                      <a:gsLst>
+                        <a:gs pos="0">
+                          <a:schemeClr val="accent1">
+                            <a:shade val="30000"/>
+                            <a:satMod val="115000"/>
+                          </a:schemeClr>
+                        </a:gs>
+                        <a:gs pos="50000">
+                          <a:schemeClr val="accent1">
+                            <a:shade val="67500"/>
+                            <a:satMod val="115000"/>
+                          </a:schemeClr>
+                        </a:gs>
+                        <a:gs pos="100000">
+                          <a:schemeClr val="accent1">
+                            <a:shade val="100000"/>
+                            <a:satMod val="115000"/>
+                          </a:schemeClr>
+                        </a:gs>
+                      </a:gsLst>
+                      <a:lin ang="8100000" scaled="1"/>
+                      <a:tileRect/>
+                    </a:gradFill>
+                  </a:tcPr>
                 </a:tc>
                 <a:extLst>
                   <a:ext uri="{0D108BD9-81ED-4DB2-BD59-A6C34878D82A}">
@@ -12839,7 +13639,32 @@
                       <a:endParaRPr lang="it-IT" dirty="0"/>
                     </a:p>
                   </a:txBody>
-                  <a:tcPr/>
+                  <a:tcPr>
+                    <a:gradFill flip="none" rotWithShape="1">
+                      <a:gsLst>
+                        <a:gs pos="0">
+                          <a:schemeClr val="accent1">
+                            <a:shade val="30000"/>
+                            <a:satMod val="115000"/>
+                          </a:schemeClr>
+                        </a:gs>
+                        <a:gs pos="50000">
+                          <a:schemeClr val="accent1">
+                            <a:shade val="67500"/>
+                            <a:satMod val="115000"/>
+                          </a:schemeClr>
+                        </a:gs>
+                        <a:gs pos="100000">
+                          <a:schemeClr val="accent1">
+                            <a:shade val="100000"/>
+                            <a:satMod val="115000"/>
+                          </a:schemeClr>
+                        </a:gs>
+                      </a:gsLst>
+                      <a:lin ang="8100000" scaled="1"/>
+                      <a:tileRect/>
+                    </a:gradFill>
+                  </a:tcPr>
                 </a:tc>
                 <a:tc>
                   <a:txBody>
@@ -12853,7 +13678,32 @@
                       <a:endParaRPr lang="it-IT" dirty="0"/>
                     </a:p>
                   </a:txBody>
-                  <a:tcPr/>
+                  <a:tcPr>
+                    <a:gradFill flip="none" rotWithShape="1">
+                      <a:gsLst>
+                        <a:gs pos="0">
+                          <a:schemeClr val="accent1">
+                            <a:shade val="30000"/>
+                            <a:satMod val="115000"/>
+                          </a:schemeClr>
+                        </a:gs>
+                        <a:gs pos="50000">
+                          <a:schemeClr val="accent1">
+                            <a:shade val="67500"/>
+                            <a:satMod val="115000"/>
+                          </a:schemeClr>
+                        </a:gs>
+                        <a:gs pos="100000">
+                          <a:schemeClr val="accent1">
+                            <a:shade val="100000"/>
+                            <a:satMod val="115000"/>
+                          </a:schemeClr>
+                        </a:gs>
+                      </a:gsLst>
+                      <a:lin ang="8100000" scaled="1"/>
+                      <a:tileRect/>
+                    </a:gradFill>
+                  </a:tcPr>
                 </a:tc>
                 <a:tc>
                   <a:txBody>
@@ -12867,7 +13717,32 @@
                       <a:endParaRPr lang="it-IT" dirty="0"/>
                     </a:p>
                   </a:txBody>
-                  <a:tcPr/>
+                  <a:tcPr>
+                    <a:gradFill flip="none" rotWithShape="1">
+                      <a:gsLst>
+                        <a:gs pos="0">
+                          <a:schemeClr val="accent1">
+                            <a:shade val="30000"/>
+                            <a:satMod val="115000"/>
+                          </a:schemeClr>
+                        </a:gs>
+                        <a:gs pos="50000">
+                          <a:schemeClr val="accent1">
+                            <a:shade val="67500"/>
+                            <a:satMod val="115000"/>
+                          </a:schemeClr>
+                        </a:gs>
+                        <a:gs pos="100000">
+                          <a:schemeClr val="accent1">
+                            <a:shade val="100000"/>
+                            <a:satMod val="115000"/>
+                          </a:schemeClr>
+                        </a:gs>
+                      </a:gsLst>
+                      <a:lin ang="8100000" scaled="1"/>
+                      <a:tileRect/>
+                    </a:gradFill>
+                  </a:tcPr>
                 </a:tc>
                 <a:tc>
                   <a:txBody>
@@ -12909,7 +13784,32 @@
                       <a:endParaRPr lang="it-IT" sz="1600" dirty="0"/>
                     </a:p>
                   </a:txBody>
-                  <a:tcPr/>
+                  <a:tcPr>
+                    <a:gradFill flip="none" rotWithShape="1">
+                      <a:gsLst>
+                        <a:gs pos="0">
+                          <a:schemeClr val="accent1">
+                            <a:shade val="30000"/>
+                            <a:satMod val="115000"/>
+                          </a:schemeClr>
+                        </a:gs>
+                        <a:gs pos="50000">
+                          <a:schemeClr val="accent1">
+                            <a:shade val="67500"/>
+                            <a:satMod val="115000"/>
+                          </a:schemeClr>
+                        </a:gs>
+                        <a:gs pos="100000">
+                          <a:schemeClr val="accent1">
+                            <a:shade val="100000"/>
+                            <a:satMod val="115000"/>
+                          </a:schemeClr>
+                        </a:gs>
+                      </a:gsLst>
+                      <a:lin ang="8100000" scaled="1"/>
+                      <a:tileRect/>
+                    </a:gradFill>
+                  </a:tcPr>
                 </a:tc>
                 <a:extLst>
                   <a:ext uri="{0D108BD9-81ED-4DB2-BD59-A6C34878D82A}">
@@ -12950,7 +13850,32 @@
                       <a:endParaRPr lang="it-IT" dirty="0"/>
                     </a:p>
                   </a:txBody>
-                  <a:tcPr/>
+                  <a:tcPr>
+                    <a:gradFill flip="none" rotWithShape="1">
+                      <a:gsLst>
+                        <a:gs pos="0">
+                          <a:schemeClr val="accent1">
+                            <a:shade val="30000"/>
+                            <a:satMod val="115000"/>
+                          </a:schemeClr>
+                        </a:gs>
+                        <a:gs pos="50000">
+                          <a:schemeClr val="accent1">
+                            <a:shade val="67500"/>
+                            <a:satMod val="115000"/>
+                          </a:schemeClr>
+                        </a:gs>
+                        <a:gs pos="100000">
+                          <a:schemeClr val="accent1">
+                            <a:shade val="100000"/>
+                            <a:satMod val="115000"/>
+                          </a:schemeClr>
+                        </a:gs>
+                      </a:gsLst>
+                      <a:lin ang="8100000" scaled="1"/>
+                      <a:tileRect/>
+                    </a:gradFill>
+                  </a:tcPr>
                 </a:tc>
                 <a:tc>
                   <a:txBody>
@@ -12964,7 +13889,32 @@
                       <a:endParaRPr lang="it-IT" dirty="0"/>
                     </a:p>
                   </a:txBody>
-                  <a:tcPr/>
+                  <a:tcPr>
+                    <a:gradFill flip="none" rotWithShape="1">
+                      <a:gsLst>
+                        <a:gs pos="0">
+                          <a:schemeClr val="accent1">
+                            <a:shade val="30000"/>
+                            <a:satMod val="115000"/>
+                          </a:schemeClr>
+                        </a:gs>
+                        <a:gs pos="50000">
+                          <a:schemeClr val="accent1">
+                            <a:shade val="67500"/>
+                            <a:satMod val="115000"/>
+                          </a:schemeClr>
+                        </a:gs>
+                        <a:gs pos="100000">
+                          <a:schemeClr val="accent1">
+                            <a:shade val="100000"/>
+                            <a:satMod val="115000"/>
+                          </a:schemeClr>
+                        </a:gs>
+                      </a:gsLst>
+                      <a:lin ang="8100000" scaled="1"/>
+                      <a:tileRect/>
+                    </a:gradFill>
+                  </a:tcPr>
                 </a:tc>
                 <a:tc>
                   <a:txBody>
@@ -12978,7 +13928,32 @@
                       <a:endParaRPr lang="it-IT" dirty="0"/>
                     </a:p>
                   </a:txBody>
-                  <a:tcPr/>
+                  <a:tcPr>
+                    <a:gradFill flip="none" rotWithShape="1">
+                      <a:gsLst>
+                        <a:gs pos="0">
+                          <a:schemeClr val="accent1">
+                            <a:shade val="30000"/>
+                            <a:satMod val="115000"/>
+                          </a:schemeClr>
+                        </a:gs>
+                        <a:gs pos="50000">
+                          <a:schemeClr val="accent1">
+                            <a:shade val="67500"/>
+                            <a:satMod val="115000"/>
+                          </a:schemeClr>
+                        </a:gs>
+                        <a:gs pos="100000">
+                          <a:schemeClr val="accent1">
+                            <a:shade val="100000"/>
+                            <a:satMod val="115000"/>
+                          </a:schemeClr>
+                        </a:gs>
+                      </a:gsLst>
+                      <a:lin ang="8100000" scaled="1"/>
+                      <a:tileRect/>
+                    </a:gradFill>
+                  </a:tcPr>
                 </a:tc>
                 <a:tc>
                   <a:txBody>
@@ -13130,7 +14105,32 @@
                       <a:endParaRPr lang="it-IT" sz="1600" dirty="0"/>
                     </a:p>
                   </a:txBody>
-                  <a:tcPr/>
+                  <a:tcPr>
+                    <a:gradFill flip="none" rotWithShape="1">
+                      <a:gsLst>
+                        <a:gs pos="0">
+                          <a:schemeClr val="accent1">
+                            <a:shade val="30000"/>
+                            <a:satMod val="115000"/>
+                          </a:schemeClr>
+                        </a:gs>
+                        <a:gs pos="50000">
+                          <a:schemeClr val="accent1">
+                            <a:shade val="67500"/>
+                            <a:satMod val="115000"/>
+                          </a:schemeClr>
+                        </a:gs>
+                        <a:gs pos="100000">
+                          <a:schemeClr val="accent1">
+                            <a:shade val="100000"/>
+                            <a:satMod val="115000"/>
+                          </a:schemeClr>
+                        </a:gs>
+                      </a:gsLst>
+                      <a:lin ang="8100000" scaled="1"/>
+                      <a:tileRect/>
+                    </a:gradFill>
+                  </a:tcPr>
                 </a:tc>
                 <a:extLst>
                   <a:ext uri="{0D108BD9-81ED-4DB2-BD59-A6C34878D82A}">
@@ -13261,7 +14261,7 @@
             <p:ph idx="1"/>
             <p:extLst>
               <p:ext uri="{D42A27DB-BD31-4B8C-83A1-F6EECF244321}">
-                <p14:modId xmlns:p14="http://schemas.microsoft.com/office/powerpoint/2010/main" val="1148321554"/>
+                <p14:modId xmlns:p14="http://schemas.microsoft.com/office/powerpoint/2010/main" val="429782990"/>
               </p:ext>
             </p:extLst>
           </p:nvPr>
@@ -13319,7 +14319,11 @@
                       <a:endParaRPr lang="it-IT" dirty="0"/>
                     </a:p>
                   </a:txBody>
-                  <a:tcPr/>
+                  <a:tcPr>
+                    <a:solidFill>
+                      <a:srgbClr val="00B050"/>
+                    </a:solidFill>
+                  </a:tcPr>
                 </a:tc>
                 <a:tc>
                   <a:txBody>
@@ -13333,7 +14337,11 @@
                       <a:endParaRPr lang="it-IT" dirty="0"/>
                     </a:p>
                   </a:txBody>
-                  <a:tcPr/>
+                  <a:tcPr>
+                    <a:solidFill>
+                      <a:srgbClr val="00B050"/>
+                    </a:solidFill>
+                  </a:tcPr>
                 </a:tc>
                 <a:tc>
                   <a:txBody>
@@ -13347,7 +14355,11 @@
                       <a:endParaRPr lang="it-IT" dirty="0"/>
                     </a:p>
                   </a:txBody>
-                  <a:tcPr/>
+                  <a:tcPr>
+                    <a:solidFill>
+                      <a:srgbClr val="00B050"/>
+                    </a:solidFill>
+                  </a:tcPr>
                 </a:tc>
                 <a:tc>
                   <a:txBody>
@@ -13361,7 +14373,11 @@
                       <a:endParaRPr lang="it-IT" dirty="0"/>
                     </a:p>
                   </a:txBody>
-                  <a:tcPr/>
+                  <a:tcPr>
+                    <a:solidFill>
+                      <a:srgbClr val="00B050"/>
+                    </a:solidFill>
+                  </a:tcPr>
                 </a:tc>
                 <a:extLst>
                   <a:ext uri="{0D108BD9-81ED-4DB2-BD59-A6C34878D82A}">
@@ -13382,7 +14398,32 @@
                       <a:endParaRPr lang="it-IT" dirty="0"/>
                     </a:p>
                   </a:txBody>
-                  <a:tcPr/>
+                  <a:tcPr>
+                    <a:gradFill flip="none" rotWithShape="1">
+                      <a:gsLst>
+                        <a:gs pos="0">
+                          <a:schemeClr val="accent1">
+                            <a:shade val="30000"/>
+                            <a:satMod val="115000"/>
+                          </a:schemeClr>
+                        </a:gs>
+                        <a:gs pos="50000">
+                          <a:schemeClr val="accent1">
+                            <a:shade val="67500"/>
+                            <a:satMod val="115000"/>
+                          </a:schemeClr>
+                        </a:gs>
+                        <a:gs pos="100000">
+                          <a:schemeClr val="accent1">
+                            <a:shade val="100000"/>
+                            <a:satMod val="115000"/>
+                          </a:schemeClr>
+                        </a:gs>
+                      </a:gsLst>
+                      <a:lin ang="10800000" scaled="1"/>
+                      <a:tileRect/>
+                    </a:gradFill>
+                  </a:tcPr>
                 </a:tc>
                 <a:tc>
                   <a:txBody>
@@ -13396,7 +14437,32 @@
                       <a:endParaRPr lang="it-IT" dirty="0"/>
                     </a:p>
                   </a:txBody>
-                  <a:tcPr/>
+                  <a:tcPr>
+                    <a:gradFill flip="none" rotWithShape="1">
+                      <a:gsLst>
+                        <a:gs pos="0">
+                          <a:schemeClr val="accent1">
+                            <a:shade val="30000"/>
+                            <a:satMod val="115000"/>
+                          </a:schemeClr>
+                        </a:gs>
+                        <a:gs pos="50000">
+                          <a:schemeClr val="accent1">
+                            <a:shade val="67500"/>
+                            <a:satMod val="115000"/>
+                          </a:schemeClr>
+                        </a:gs>
+                        <a:gs pos="100000">
+                          <a:schemeClr val="accent1">
+                            <a:shade val="100000"/>
+                            <a:satMod val="115000"/>
+                          </a:schemeClr>
+                        </a:gs>
+                      </a:gsLst>
+                      <a:lin ang="10800000" scaled="1"/>
+                      <a:tileRect/>
+                    </a:gradFill>
+                  </a:tcPr>
                 </a:tc>
                 <a:tc>
                   <a:txBody>
@@ -13410,7 +14476,32 @@
                       <a:endParaRPr lang="it-IT" dirty="0"/>
                     </a:p>
                   </a:txBody>
-                  <a:tcPr/>
+                  <a:tcPr>
+                    <a:gradFill flip="none" rotWithShape="1">
+                      <a:gsLst>
+                        <a:gs pos="0">
+                          <a:schemeClr val="accent1">
+                            <a:shade val="30000"/>
+                            <a:satMod val="115000"/>
+                          </a:schemeClr>
+                        </a:gs>
+                        <a:gs pos="50000">
+                          <a:schemeClr val="accent1">
+                            <a:shade val="67500"/>
+                            <a:satMod val="115000"/>
+                          </a:schemeClr>
+                        </a:gs>
+                        <a:gs pos="100000">
+                          <a:schemeClr val="accent1">
+                            <a:shade val="100000"/>
+                            <a:satMod val="115000"/>
+                          </a:schemeClr>
+                        </a:gs>
+                      </a:gsLst>
+                      <a:lin ang="10800000" scaled="1"/>
+                      <a:tileRect/>
+                    </a:gradFill>
+                  </a:tcPr>
                 </a:tc>
                 <a:tc>
                   <a:txBody>
@@ -13424,7 +14515,32 @@
                       <a:endParaRPr lang="it-IT" sz="1600" dirty="0"/>
                     </a:p>
                   </a:txBody>
-                  <a:tcPr/>
+                  <a:tcPr>
+                    <a:gradFill flip="none" rotWithShape="1">
+                      <a:gsLst>
+                        <a:gs pos="0">
+                          <a:schemeClr val="accent1">
+                            <a:shade val="30000"/>
+                            <a:satMod val="115000"/>
+                          </a:schemeClr>
+                        </a:gs>
+                        <a:gs pos="50000">
+                          <a:schemeClr val="accent1">
+                            <a:shade val="67500"/>
+                            <a:satMod val="115000"/>
+                          </a:schemeClr>
+                        </a:gs>
+                        <a:gs pos="100000">
+                          <a:schemeClr val="accent1">
+                            <a:shade val="100000"/>
+                            <a:satMod val="115000"/>
+                          </a:schemeClr>
+                        </a:gs>
+                      </a:gsLst>
+                      <a:lin ang="10800000" scaled="1"/>
+                      <a:tileRect/>
+                    </a:gradFill>
+                  </a:tcPr>
                 </a:tc>
                 <a:extLst>
                   <a:ext uri="{0D108BD9-81ED-4DB2-BD59-A6C34878D82A}">
@@ -13445,7 +14561,32 @@
                       <a:endParaRPr lang="it-IT" dirty="0"/>
                     </a:p>
                   </a:txBody>
-                  <a:tcPr/>
+                  <a:tcPr>
+                    <a:gradFill flip="none" rotWithShape="1">
+                      <a:gsLst>
+                        <a:gs pos="0">
+                          <a:schemeClr val="accent1">
+                            <a:shade val="30000"/>
+                            <a:satMod val="115000"/>
+                          </a:schemeClr>
+                        </a:gs>
+                        <a:gs pos="50000">
+                          <a:schemeClr val="accent1">
+                            <a:shade val="67500"/>
+                            <a:satMod val="115000"/>
+                          </a:schemeClr>
+                        </a:gs>
+                        <a:gs pos="100000">
+                          <a:schemeClr val="accent1">
+                            <a:shade val="100000"/>
+                            <a:satMod val="115000"/>
+                          </a:schemeClr>
+                        </a:gs>
+                      </a:gsLst>
+                      <a:lin ang="10800000" scaled="1"/>
+                      <a:tileRect/>
+                    </a:gradFill>
+                  </a:tcPr>
                 </a:tc>
                 <a:tc>
                   <a:txBody>
@@ -13459,7 +14600,32 @@
                       <a:endParaRPr lang="it-IT" dirty="0"/>
                     </a:p>
                   </a:txBody>
-                  <a:tcPr/>
+                  <a:tcPr>
+                    <a:gradFill flip="none" rotWithShape="1">
+                      <a:gsLst>
+                        <a:gs pos="0">
+                          <a:schemeClr val="accent1">
+                            <a:shade val="30000"/>
+                            <a:satMod val="115000"/>
+                          </a:schemeClr>
+                        </a:gs>
+                        <a:gs pos="50000">
+                          <a:schemeClr val="accent1">
+                            <a:shade val="67500"/>
+                            <a:satMod val="115000"/>
+                          </a:schemeClr>
+                        </a:gs>
+                        <a:gs pos="100000">
+                          <a:schemeClr val="accent1">
+                            <a:shade val="100000"/>
+                            <a:satMod val="115000"/>
+                          </a:schemeClr>
+                        </a:gs>
+                      </a:gsLst>
+                      <a:lin ang="10800000" scaled="1"/>
+                      <a:tileRect/>
+                    </a:gradFill>
+                  </a:tcPr>
                 </a:tc>
                 <a:tc>
                   <a:txBody>
@@ -13473,7 +14639,32 @@
                       <a:endParaRPr lang="it-IT" dirty="0"/>
                     </a:p>
                   </a:txBody>
-                  <a:tcPr/>
+                  <a:tcPr>
+                    <a:gradFill flip="none" rotWithShape="1">
+                      <a:gsLst>
+                        <a:gs pos="0">
+                          <a:schemeClr val="accent1">
+                            <a:shade val="30000"/>
+                            <a:satMod val="115000"/>
+                          </a:schemeClr>
+                        </a:gs>
+                        <a:gs pos="50000">
+                          <a:schemeClr val="accent1">
+                            <a:shade val="67500"/>
+                            <a:satMod val="115000"/>
+                          </a:schemeClr>
+                        </a:gs>
+                        <a:gs pos="100000">
+                          <a:schemeClr val="accent1">
+                            <a:shade val="100000"/>
+                            <a:satMod val="115000"/>
+                          </a:schemeClr>
+                        </a:gs>
+                      </a:gsLst>
+                      <a:lin ang="10800000" scaled="1"/>
+                      <a:tileRect/>
+                    </a:gradFill>
+                  </a:tcPr>
                 </a:tc>
                 <a:tc>
                   <a:txBody>
@@ -13487,7 +14678,32 @@
                       <a:endParaRPr lang="it-IT" sz="1600" dirty="0"/>
                     </a:p>
                   </a:txBody>
-                  <a:tcPr/>
+                  <a:tcPr>
+                    <a:gradFill flip="none" rotWithShape="1">
+                      <a:gsLst>
+                        <a:gs pos="0">
+                          <a:schemeClr val="accent1">
+                            <a:shade val="30000"/>
+                            <a:satMod val="115000"/>
+                          </a:schemeClr>
+                        </a:gs>
+                        <a:gs pos="50000">
+                          <a:schemeClr val="accent1">
+                            <a:shade val="67500"/>
+                            <a:satMod val="115000"/>
+                          </a:schemeClr>
+                        </a:gs>
+                        <a:gs pos="100000">
+                          <a:schemeClr val="accent1">
+                            <a:shade val="100000"/>
+                            <a:satMod val="115000"/>
+                          </a:schemeClr>
+                        </a:gs>
+                      </a:gsLst>
+                      <a:lin ang="10800000" scaled="1"/>
+                      <a:tileRect/>
+                    </a:gradFill>
+                  </a:tcPr>
                 </a:tc>
                 <a:extLst>
                   <a:ext uri="{0D108BD9-81ED-4DB2-BD59-A6C34878D82A}">
@@ -13508,7 +14724,32 @@
                       <a:endParaRPr lang="it-IT" dirty="0"/>
                     </a:p>
                   </a:txBody>
-                  <a:tcPr/>
+                  <a:tcPr>
+                    <a:gradFill flip="none" rotWithShape="1">
+                      <a:gsLst>
+                        <a:gs pos="0">
+                          <a:schemeClr val="accent1">
+                            <a:shade val="30000"/>
+                            <a:satMod val="115000"/>
+                          </a:schemeClr>
+                        </a:gs>
+                        <a:gs pos="50000">
+                          <a:schemeClr val="accent1">
+                            <a:shade val="67500"/>
+                            <a:satMod val="115000"/>
+                          </a:schemeClr>
+                        </a:gs>
+                        <a:gs pos="100000">
+                          <a:schemeClr val="accent1">
+                            <a:shade val="100000"/>
+                            <a:satMod val="115000"/>
+                          </a:schemeClr>
+                        </a:gs>
+                      </a:gsLst>
+                      <a:lin ang="10800000" scaled="1"/>
+                      <a:tileRect/>
+                    </a:gradFill>
+                  </a:tcPr>
                 </a:tc>
                 <a:tc>
                   <a:txBody>
@@ -13522,7 +14763,32 @@
                       <a:endParaRPr lang="it-IT" dirty="0"/>
                     </a:p>
                   </a:txBody>
-                  <a:tcPr/>
+                  <a:tcPr>
+                    <a:gradFill flip="none" rotWithShape="1">
+                      <a:gsLst>
+                        <a:gs pos="0">
+                          <a:schemeClr val="accent1">
+                            <a:shade val="30000"/>
+                            <a:satMod val="115000"/>
+                          </a:schemeClr>
+                        </a:gs>
+                        <a:gs pos="50000">
+                          <a:schemeClr val="accent1">
+                            <a:shade val="67500"/>
+                            <a:satMod val="115000"/>
+                          </a:schemeClr>
+                        </a:gs>
+                        <a:gs pos="100000">
+                          <a:schemeClr val="accent1">
+                            <a:shade val="100000"/>
+                            <a:satMod val="115000"/>
+                          </a:schemeClr>
+                        </a:gs>
+                      </a:gsLst>
+                      <a:lin ang="10800000" scaled="1"/>
+                      <a:tileRect/>
+                    </a:gradFill>
+                  </a:tcPr>
                 </a:tc>
                 <a:tc>
                   <a:txBody>
@@ -13536,7 +14802,32 @@
                       <a:endParaRPr lang="it-IT" dirty="0"/>
                     </a:p>
                   </a:txBody>
-                  <a:tcPr/>
+                  <a:tcPr>
+                    <a:gradFill flip="none" rotWithShape="1">
+                      <a:gsLst>
+                        <a:gs pos="0">
+                          <a:schemeClr val="accent1">
+                            <a:shade val="30000"/>
+                            <a:satMod val="115000"/>
+                          </a:schemeClr>
+                        </a:gs>
+                        <a:gs pos="50000">
+                          <a:schemeClr val="accent1">
+                            <a:shade val="67500"/>
+                            <a:satMod val="115000"/>
+                          </a:schemeClr>
+                        </a:gs>
+                        <a:gs pos="100000">
+                          <a:schemeClr val="accent1">
+                            <a:shade val="100000"/>
+                            <a:satMod val="115000"/>
+                          </a:schemeClr>
+                        </a:gs>
+                      </a:gsLst>
+                      <a:lin ang="10800000" scaled="1"/>
+                      <a:tileRect/>
+                    </a:gradFill>
+                  </a:tcPr>
                 </a:tc>
                 <a:tc>
                   <a:txBody>
@@ -13567,7 +14858,32 @@
                       <a:endParaRPr lang="it-IT" sz="1600" dirty="0"/>
                     </a:p>
                   </a:txBody>
-                  <a:tcPr/>
+                  <a:tcPr>
+                    <a:gradFill flip="none" rotWithShape="1">
+                      <a:gsLst>
+                        <a:gs pos="0">
+                          <a:schemeClr val="accent1">
+                            <a:shade val="30000"/>
+                            <a:satMod val="115000"/>
+                          </a:schemeClr>
+                        </a:gs>
+                        <a:gs pos="50000">
+                          <a:schemeClr val="accent1">
+                            <a:shade val="67500"/>
+                            <a:satMod val="115000"/>
+                          </a:schemeClr>
+                        </a:gs>
+                        <a:gs pos="100000">
+                          <a:schemeClr val="accent1">
+                            <a:shade val="100000"/>
+                            <a:satMod val="115000"/>
+                          </a:schemeClr>
+                        </a:gs>
+                      </a:gsLst>
+                      <a:lin ang="10800000" scaled="1"/>
+                      <a:tileRect/>
+                    </a:gradFill>
+                  </a:tcPr>
                 </a:tc>
                 <a:extLst>
                   <a:ext uri="{0D108BD9-81ED-4DB2-BD59-A6C34878D82A}">
@@ -13588,7 +14904,32 @@
                       <a:endParaRPr lang="it-IT" dirty="0"/>
                     </a:p>
                   </a:txBody>
-                  <a:tcPr/>
+                  <a:tcPr>
+                    <a:gradFill flip="none" rotWithShape="1">
+                      <a:gsLst>
+                        <a:gs pos="0">
+                          <a:schemeClr val="accent1">
+                            <a:shade val="30000"/>
+                            <a:satMod val="115000"/>
+                          </a:schemeClr>
+                        </a:gs>
+                        <a:gs pos="50000">
+                          <a:schemeClr val="accent1">
+                            <a:shade val="67500"/>
+                            <a:satMod val="115000"/>
+                          </a:schemeClr>
+                        </a:gs>
+                        <a:gs pos="100000">
+                          <a:schemeClr val="accent1">
+                            <a:shade val="100000"/>
+                            <a:satMod val="115000"/>
+                          </a:schemeClr>
+                        </a:gs>
+                      </a:gsLst>
+                      <a:lin ang="10800000" scaled="1"/>
+                      <a:tileRect/>
+                    </a:gradFill>
+                  </a:tcPr>
                 </a:tc>
                 <a:tc>
                   <a:txBody>
@@ -13602,7 +14943,32 @@
                       <a:endParaRPr lang="it-IT" dirty="0"/>
                     </a:p>
                   </a:txBody>
-                  <a:tcPr/>
+                  <a:tcPr>
+                    <a:gradFill flip="none" rotWithShape="1">
+                      <a:gsLst>
+                        <a:gs pos="0">
+                          <a:schemeClr val="accent1">
+                            <a:shade val="30000"/>
+                            <a:satMod val="115000"/>
+                          </a:schemeClr>
+                        </a:gs>
+                        <a:gs pos="50000">
+                          <a:schemeClr val="accent1">
+                            <a:shade val="67500"/>
+                            <a:satMod val="115000"/>
+                          </a:schemeClr>
+                        </a:gs>
+                        <a:gs pos="100000">
+                          <a:schemeClr val="accent1">
+                            <a:shade val="100000"/>
+                            <a:satMod val="115000"/>
+                          </a:schemeClr>
+                        </a:gs>
+                      </a:gsLst>
+                      <a:lin ang="10800000" scaled="1"/>
+                      <a:tileRect/>
+                    </a:gradFill>
+                  </a:tcPr>
                 </a:tc>
                 <a:tc>
                   <a:txBody>
@@ -13616,7 +14982,32 @@
                       <a:endParaRPr lang="it-IT" dirty="0"/>
                     </a:p>
                   </a:txBody>
-                  <a:tcPr/>
+                  <a:tcPr>
+                    <a:gradFill flip="none" rotWithShape="1">
+                      <a:gsLst>
+                        <a:gs pos="0">
+                          <a:schemeClr val="accent1">
+                            <a:shade val="30000"/>
+                            <a:satMod val="115000"/>
+                          </a:schemeClr>
+                        </a:gs>
+                        <a:gs pos="50000">
+                          <a:schemeClr val="accent1">
+                            <a:shade val="67500"/>
+                            <a:satMod val="115000"/>
+                          </a:schemeClr>
+                        </a:gs>
+                        <a:gs pos="100000">
+                          <a:schemeClr val="accent1">
+                            <a:shade val="100000"/>
+                            <a:satMod val="115000"/>
+                          </a:schemeClr>
+                        </a:gs>
+                      </a:gsLst>
+                      <a:lin ang="10800000" scaled="1"/>
+                      <a:tileRect/>
+                    </a:gradFill>
+                  </a:tcPr>
                 </a:tc>
                 <a:tc>
                   <a:txBody>
@@ -13630,7 +15021,32 @@
                       <a:endParaRPr lang="it-IT" sz="1600" dirty="0"/>
                     </a:p>
                   </a:txBody>
-                  <a:tcPr/>
+                  <a:tcPr>
+                    <a:gradFill flip="none" rotWithShape="1">
+                      <a:gsLst>
+                        <a:gs pos="0">
+                          <a:schemeClr val="accent1">
+                            <a:shade val="30000"/>
+                            <a:satMod val="115000"/>
+                          </a:schemeClr>
+                        </a:gs>
+                        <a:gs pos="50000">
+                          <a:schemeClr val="accent1">
+                            <a:shade val="67500"/>
+                            <a:satMod val="115000"/>
+                          </a:schemeClr>
+                        </a:gs>
+                        <a:gs pos="100000">
+                          <a:schemeClr val="accent1">
+                            <a:shade val="100000"/>
+                            <a:satMod val="115000"/>
+                          </a:schemeClr>
+                        </a:gs>
+                      </a:gsLst>
+                      <a:lin ang="10800000" scaled="1"/>
+                      <a:tileRect/>
+                    </a:gradFill>
+                  </a:tcPr>
                 </a:tc>
                 <a:extLst>
                   <a:ext uri="{0D108BD9-81ED-4DB2-BD59-A6C34878D82A}">
@@ -13756,10 +15172,10 @@
       </p:sp>
       <p:pic>
         <p:nvPicPr>
-          <p:cNvPr id="12" name="Segnaposto contenuto 11">
+          <p:cNvPr id="10" name="Segnaposto contenuto 9">
             <a:extLst>
               <a:ext uri="{FF2B5EF4-FFF2-40B4-BE49-F238E27FC236}">
-                <a16:creationId xmlns:a16="http://schemas.microsoft.com/office/drawing/2014/main" id="{F8AB8984-6E99-486B-BB12-02934E65BF25}"/>
+                <a16:creationId xmlns:a16="http://schemas.microsoft.com/office/drawing/2014/main" id="{679EE48B-5FD8-48D8-BC45-97DF1D1A6A00}"/>
               </a:ext>
             </a:extLst>
           </p:cNvPr>
@@ -13784,8 +15200,8 @@
         </p:blipFill>
         <p:spPr>
           <a:xfrm>
-            <a:off x="311284" y="970088"/>
-            <a:ext cx="9180253" cy="5696638"/>
+            <a:off x="0" y="902268"/>
+            <a:ext cx="9601200" cy="5955732"/>
           </a:xfrm>
         </p:spPr>
       </p:pic>
@@ -13869,7 +15285,7 @@
             <p:ph idx="1"/>
             <p:extLst>
               <p:ext uri="{D42A27DB-BD31-4B8C-83A1-F6EECF244321}">
-                <p14:modId xmlns:p14="http://schemas.microsoft.com/office/powerpoint/2010/main" val="2087818187"/>
+                <p14:modId xmlns:p14="http://schemas.microsoft.com/office/powerpoint/2010/main" val="2343041910"/>
               </p:ext>
             </p:extLst>
           </p:nvPr>
@@ -13926,7 +15342,11 @@
                       </a:r>
                     </a:p>
                   </a:txBody>
-                  <a:tcPr/>
+                  <a:tcPr>
+                    <a:solidFill>
+                      <a:srgbClr val="00B050"/>
+                    </a:solidFill>
+                  </a:tcPr>
                 </a:tc>
                 <a:tc>
                   <a:txBody>
@@ -13939,7 +15359,11 @@
                       </a:r>
                     </a:p>
                   </a:txBody>
-                  <a:tcPr/>
+                  <a:tcPr>
+                    <a:solidFill>
+                      <a:srgbClr val="00B050"/>
+                    </a:solidFill>
+                  </a:tcPr>
                 </a:tc>
                 <a:tc>
                   <a:txBody>
@@ -13952,7 +15376,11 @@
                       </a:r>
                     </a:p>
                   </a:txBody>
-                  <a:tcPr/>
+                  <a:tcPr>
+                    <a:solidFill>
+                      <a:srgbClr val="00B050"/>
+                    </a:solidFill>
+                  </a:tcPr>
                 </a:tc>
                 <a:tc>
                   <a:txBody>
@@ -13966,7 +15394,11 @@
                       <a:endParaRPr lang="it-IT" dirty="0"/>
                     </a:p>
                   </a:txBody>
-                  <a:tcPr/>
+                  <a:tcPr>
+                    <a:solidFill>
+                      <a:srgbClr val="00B050"/>
+                    </a:solidFill>
+                  </a:tcPr>
                 </a:tc>
                 <a:extLst>
                   <a:ext uri="{0D108BD9-81ED-4DB2-BD59-A6C34878D82A}">
@@ -13991,7 +15423,33 @@
                       <a:endParaRPr lang="it-IT" dirty="0"/>
                     </a:p>
                   </a:txBody>
-                  <a:tcPr/>
+                  <a:tcPr>
+                    <a:gradFill flip="none" rotWithShape="1">
+                      <a:gsLst>
+                        <a:gs pos="0">
+                          <a:schemeClr val="accent1">
+                            <a:lumMod val="40000"/>
+                            <a:lumOff val="60000"/>
+                          </a:schemeClr>
+                        </a:gs>
+                        <a:gs pos="46000">
+                          <a:schemeClr val="accent1">
+                            <a:lumMod val="95000"/>
+                            <a:lumOff val="5000"/>
+                          </a:schemeClr>
+                        </a:gs>
+                        <a:gs pos="100000">
+                          <a:schemeClr val="accent1">
+                            <a:lumMod val="60000"/>
+                          </a:schemeClr>
+                        </a:gs>
+                      </a:gsLst>
+                      <a:path path="circle">
+                        <a:fillToRect l="50000" t="130000" r="50000" b="-30000"/>
+                      </a:path>
+                      <a:tileRect/>
+                    </a:gradFill>
+                  </a:tcPr>
                 </a:tc>
                 <a:tc>
                   <a:txBody>
@@ -14005,7 +15463,33 @@
                       <a:endParaRPr lang="it-IT" dirty="0"/>
                     </a:p>
                   </a:txBody>
-                  <a:tcPr/>
+                  <a:tcPr>
+                    <a:gradFill flip="none" rotWithShape="1">
+                      <a:gsLst>
+                        <a:gs pos="0">
+                          <a:schemeClr val="accent1">
+                            <a:lumMod val="40000"/>
+                            <a:lumOff val="60000"/>
+                          </a:schemeClr>
+                        </a:gs>
+                        <a:gs pos="46000">
+                          <a:schemeClr val="accent1">
+                            <a:lumMod val="95000"/>
+                            <a:lumOff val="5000"/>
+                          </a:schemeClr>
+                        </a:gs>
+                        <a:gs pos="100000">
+                          <a:schemeClr val="accent1">
+                            <a:lumMod val="60000"/>
+                          </a:schemeClr>
+                        </a:gs>
+                      </a:gsLst>
+                      <a:path path="circle">
+                        <a:fillToRect l="50000" t="130000" r="50000" b="-30000"/>
+                      </a:path>
+                      <a:tileRect/>
+                    </a:gradFill>
+                  </a:tcPr>
                 </a:tc>
                 <a:tc>
                   <a:txBody>
@@ -14019,7 +15503,33 @@
                       <a:endParaRPr lang="it-IT" dirty="0"/>
                     </a:p>
                   </a:txBody>
-                  <a:tcPr/>
+                  <a:tcPr>
+                    <a:gradFill flip="none" rotWithShape="1">
+                      <a:gsLst>
+                        <a:gs pos="0">
+                          <a:schemeClr val="accent1">
+                            <a:lumMod val="40000"/>
+                            <a:lumOff val="60000"/>
+                          </a:schemeClr>
+                        </a:gs>
+                        <a:gs pos="46000">
+                          <a:schemeClr val="accent1">
+                            <a:lumMod val="95000"/>
+                            <a:lumOff val="5000"/>
+                          </a:schemeClr>
+                        </a:gs>
+                        <a:gs pos="100000">
+                          <a:schemeClr val="accent1">
+                            <a:lumMod val="60000"/>
+                          </a:schemeClr>
+                        </a:gs>
+                      </a:gsLst>
+                      <a:path path="circle">
+                        <a:fillToRect l="50000" t="130000" r="50000" b="-30000"/>
+                      </a:path>
+                      <a:tileRect/>
+                    </a:gradFill>
+                  </a:tcPr>
                 </a:tc>
                 <a:tc>
                   <a:txBody>
@@ -14033,7 +15543,33 @@
                       <a:endParaRPr lang="it-IT" dirty="0"/>
                     </a:p>
                   </a:txBody>
-                  <a:tcPr/>
+                  <a:tcPr>
+                    <a:gradFill flip="none" rotWithShape="1">
+                      <a:gsLst>
+                        <a:gs pos="0">
+                          <a:schemeClr val="accent1">
+                            <a:lumMod val="40000"/>
+                            <a:lumOff val="60000"/>
+                          </a:schemeClr>
+                        </a:gs>
+                        <a:gs pos="46000">
+                          <a:schemeClr val="accent1">
+                            <a:lumMod val="95000"/>
+                            <a:lumOff val="5000"/>
+                          </a:schemeClr>
+                        </a:gs>
+                        <a:gs pos="100000">
+                          <a:schemeClr val="accent1">
+                            <a:lumMod val="60000"/>
+                          </a:schemeClr>
+                        </a:gs>
+                      </a:gsLst>
+                      <a:path path="circle">
+                        <a:fillToRect l="50000" t="130000" r="50000" b="-30000"/>
+                      </a:path>
+                      <a:tileRect/>
+                    </a:gradFill>
+                  </a:tcPr>
                 </a:tc>
                 <a:extLst>
                   <a:ext uri="{0D108BD9-81ED-4DB2-BD59-A6C34878D82A}">
@@ -14054,7 +15590,33 @@
                       <a:endParaRPr lang="it-IT" dirty="0"/>
                     </a:p>
                   </a:txBody>
-                  <a:tcPr/>
+                  <a:tcPr>
+                    <a:gradFill flip="none" rotWithShape="1">
+                      <a:gsLst>
+                        <a:gs pos="0">
+                          <a:schemeClr val="accent1">
+                            <a:lumMod val="40000"/>
+                            <a:lumOff val="60000"/>
+                          </a:schemeClr>
+                        </a:gs>
+                        <a:gs pos="46000">
+                          <a:schemeClr val="accent1">
+                            <a:lumMod val="95000"/>
+                            <a:lumOff val="5000"/>
+                          </a:schemeClr>
+                        </a:gs>
+                        <a:gs pos="100000">
+                          <a:schemeClr val="accent1">
+                            <a:lumMod val="60000"/>
+                          </a:schemeClr>
+                        </a:gs>
+                      </a:gsLst>
+                      <a:path path="circle">
+                        <a:fillToRect l="50000" t="130000" r="50000" b="-30000"/>
+                      </a:path>
+                      <a:tileRect/>
+                    </a:gradFill>
+                  </a:tcPr>
                 </a:tc>
                 <a:tc>
                   <a:txBody>
@@ -14068,7 +15630,33 @@
                       <a:endParaRPr lang="it-IT" dirty="0"/>
                     </a:p>
                   </a:txBody>
-                  <a:tcPr/>
+                  <a:tcPr>
+                    <a:gradFill flip="none" rotWithShape="1">
+                      <a:gsLst>
+                        <a:gs pos="0">
+                          <a:schemeClr val="accent1">
+                            <a:lumMod val="40000"/>
+                            <a:lumOff val="60000"/>
+                          </a:schemeClr>
+                        </a:gs>
+                        <a:gs pos="46000">
+                          <a:schemeClr val="accent1">
+                            <a:lumMod val="95000"/>
+                            <a:lumOff val="5000"/>
+                          </a:schemeClr>
+                        </a:gs>
+                        <a:gs pos="100000">
+                          <a:schemeClr val="accent1">
+                            <a:lumMod val="60000"/>
+                          </a:schemeClr>
+                        </a:gs>
+                      </a:gsLst>
+                      <a:path path="circle">
+                        <a:fillToRect l="50000" t="130000" r="50000" b="-30000"/>
+                      </a:path>
+                      <a:tileRect/>
+                    </a:gradFill>
+                  </a:tcPr>
                 </a:tc>
                 <a:tc>
                   <a:txBody>
@@ -14082,7 +15670,33 @@
                       <a:endParaRPr lang="it-IT" dirty="0"/>
                     </a:p>
                   </a:txBody>
-                  <a:tcPr/>
+                  <a:tcPr>
+                    <a:gradFill flip="none" rotWithShape="1">
+                      <a:gsLst>
+                        <a:gs pos="0">
+                          <a:schemeClr val="accent1">
+                            <a:lumMod val="40000"/>
+                            <a:lumOff val="60000"/>
+                          </a:schemeClr>
+                        </a:gs>
+                        <a:gs pos="46000">
+                          <a:schemeClr val="accent1">
+                            <a:lumMod val="95000"/>
+                            <a:lumOff val="5000"/>
+                          </a:schemeClr>
+                        </a:gs>
+                        <a:gs pos="100000">
+                          <a:schemeClr val="accent1">
+                            <a:lumMod val="60000"/>
+                          </a:schemeClr>
+                        </a:gs>
+                      </a:gsLst>
+                      <a:path path="circle">
+                        <a:fillToRect l="50000" t="130000" r="50000" b="-30000"/>
+                      </a:path>
+                      <a:tileRect/>
+                    </a:gradFill>
+                  </a:tcPr>
                 </a:tc>
                 <a:tc>
                   <a:txBody>
@@ -14096,7 +15710,33 @@
                       <a:endParaRPr lang="it-IT" dirty="0"/>
                     </a:p>
                   </a:txBody>
-                  <a:tcPr/>
+                  <a:tcPr>
+                    <a:gradFill flip="none" rotWithShape="1">
+                      <a:gsLst>
+                        <a:gs pos="0">
+                          <a:schemeClr val="accent1">
+                            <a:lumMod val="40000"/>
+                            <a:lumOff val="60000"/>
+                          </a:schemeClr>
+                        </a:gs>
+                        <a:gs pos="46000">
+                          <a:schemeClr val="accent1">
+                            <a:lumMod val="95000"/>
+                            <a:lumOff val="5000"/>
+                          </a:schemeClr>
+                        </a:gs>
+                        <a:gs pos="100000">
+                          <a:schemeClr val="accent1">
+                            <a:lumMod val="60000"/>
+                          </a:schemeClr>
+                        </a:gs>
+                      </a:gsLst>
+                      <a:path path="circle">
+                        <a:fillToRect l="50000" t="130000" r="50000" b="-30000"/>
+                      </a:path>
+                      <a:tileRect/>
+                    </a:gradFill>
+                  </a:tcPr>
                 </a:tc>
                 <a:extLst>
                   <a:ext uri="{0D108BD9-81ED-4DB2-BD59-A6C34878D82A}">
@@ -14117,7 +15757,33 @@
                       <a:endParaRPr lang="it-IT" dirty="0"/>
                     </a:p>
                   </a:txBody>
-                  <a:tcPr/>
+                  <a:tcPr>
+                    <a:gradFill flip="none" rotWithShape="1">
+                      <a:gsLst>
+                        <a:gs pos="0">
+                          <a:schemeClr val="accent1">
+                            <a:lumMod val="40000"/>
+                            <a:lumOff val="60000"/>
+                          </a:schemeClr>
+                        </a:gs>
+                        <a:gs pos="46000">
+                          <a:schemeClr val="accent1">
+                            <a:lumMod val="95000"/>
+                            <a:lumOff val="5000"/>
+                          </a:schemeClr>
+                        </a:gs>
+                        <a:gs pos="100000">
+                          <a:schemeClr val="accent1">
+                            <a:lumMod val="60000"/>
+                          </a:schemeClr>
+                        </a:gs>
+                      </a:gsLst>
+                      <a:path path="circle">
+                        <a:fillToRect l="50000" t="130000" r="50000" b="-30000"/>
+                      </a:path>
+                      <a:tileRect/>
+                    </a:gradFill>
+                  </a:tcPr>
                 </a:tc>
                 <a:tc>
                   <a:txBody>
@@ -14131,7 +15797,33 @@
                       <a:endParaRPr lang="it-IT" dirty="0"/>
                     </a:p>
                   </a:txBody>
-                  <a:tcPr/>
+                  <a:tcPr>
+                    <a:gradFill flip="none" rotWithShape="1">
+                      <a:gsLst>
+                        <a:gs pos="0">
+                          <a:schemeClr val="accent1">
+                            <a:lumMod val="40000"/>
+                            <a:lumOff val="60000"/>
+                          </a:schemeClr>
+                        </a:gs>
+                        <a:gs pos="46000">
+                          <a:schemeClr val="accent1">
+                            <a:lumMod val="95000"/>
+                            <a:lumOff val="5000"/>
+                          </a:schemeClr>
+                        </a:gs>
+                        <a:gs pos="100000">
+                          <a:schemeClr val="accent1">
+                            <a:lumMod val="60000"/>
+                          </a:schemeClr>
+                        </a:gs>
+                      </a:gsLst>
+                      <a:path path="circle">
+                        <a:fillToRect l="50000" t="130000" r="50000" b="-30000"/>
+                      </a:path>
+                      <a:tileRect/>
+                    </a:gradFill>
+                  </a:tcPr>
                 </a:tc>
                 <a:tc>
                   <a:txBody>
@@ -14145,7 +15837,33 @@
                       <a:endParaRPr lang="it-IT" dirty="0"/>
                     </a:p>
                   </a:txBody>
-                  <a:tcPr/>
+                  <a:tcPr>
+                    <a:gradFill flip="none" rotWithShape="1">
+                      <a:gsLst>
+                        <a:gs pos="0">
+                          <a:schemeClr val="accent1">
+                            <a:lumMod val="40000"/>
+                            <a:lumOff val="60000"/>
+                          </a:schemeClr>
+                        </a:gs>
+                        <a:gs pos="46000">
+                          <a:schemeClr val="accent1">
+                            <a:lumMod val="95000"/>
+                            <a:lumOff val="5000"/>
+                          </a:schemeClr>
+                        </a:gs>
+                        <a:gs pos="100000">
+                          <a:schemeClr val="accent1">
+                            <a:lumMod val="60000"/>
+                          </a:schemeClr>
+                        </a:gs>
+                      </a:gsLst>
+                      <a:path path="circle">
+                        <a:fillToRect l="50000" t="130000" r="50000" b="-30000"/>
+                      </a:path>
+                      <a:tileRect/>
+                    </a:gradFill>
+                  </a:tcPr>
                 </a:tc>
                 <a:tc>
                   <a:txBody>
@@ -14176,7 +15894,33 @@
                       <a:endParaRPr lang="it-IT" dirty="0"/>
                     </a:p>
                   </a:txBody>
-                  <a:tcPr/>
+                  <a:tcPr>
+                    <a:gradFill flip="none" rotWithShape="1">
+                      <a:gsLst>
+                        <a:gs pos="0">
+                          <a:schemeClr val="accent1">
+                            <a:lumMod val="40000"/>
+                            <a:lumOff val="60000"/>
+                          </a:schemeClr>
+                        </a:gs>
+                        <a:gs pos="46000">
+                          <a:schemeClr val="accent1">
+                            <a:lumMod val="95000"/>
+                            <a:lumOff val="5000"/>
+                          </a:schemeClr>
+                        </a:gs>
+                        <a:gs pos="100000">
+                          <a:schemeClr val="accent1">
+                            <a:lumMod val="60000"/>
+                          </a:schemeClr>
+                        </a:gs>
+                      </a:gsLst>
+                      <a:path path="circle">
+                        <a:fillToRect l="50000" t="130000" r="50000" b="-30000"/>
+                      </a:path>
+                      <a:tileRect/>
+                    </a:gradFill>
+                  </a:tcPr>
                 </a:tc>
                 <a:extLst>
                   <a:ext uri="{0D108BD9-81ED-4DB2-BD59-A6C34878D82A}">
@@ -14197,7 +15941,33 @@
                       <a:endParaRPr lang="it-IT" dirty="0"/>
                     </a:p>
                   </a:txBody>
-                  <a:tcPr/>
+                  <a:tcPr>
+                    <a:gradFill flip="none" rotWithShape="1">
+                      <a:gsLst>
+                        <a:gs pos="0">
+                          <a:schemeClr val="accent1">
+                            <a:lumMod val="40000"/>
+                            <a:lumOff val="60000"/>
+                          </a:schemeClr>
+                        </a:gs>
+                        <a:gs pos="46000">
+                          <a:schemeClr val="accent1">
+                            <a:lumMod val="95000"/>
+                            <a:lumOff val="5000"/>
+                          </a:schemeClr>
+                        </a:gs>
+                        <a:gs pos="100000">
+                          <a:schemeClr val="accent1">
+                            <a:lumMod val="60000"/>
+                          </a:schemeClr>
+                        </a:gs>
+                      </a:gsLst>
+                      <a:path path="circle">
+                        <a:fillToRect l="50000" t="130000" r="50000" b="-30000"/>
+                      </a:path>
+                      <a:tileRect/>
+                    </a:gradFill>
+                  </a:tcPr>
                 </a:tc>
                 <a:tc>
                   <a:txBody>
@@ -14228,7 +15998,33 @@
                       <a:endParaRPr lang="it-IT" dirty="0"/>
                     </a:p>
                   </a:txBody>
-                  <a:tcPr/>
+                  <a:tcPr>
+                    <a:gradFill flip="none" rotWithShape="1">
+                      <a:gsLst>
+                        <a:gs pos="0">
+                          <a:schemeClr val="accent1">
+                            <a:lumMod val="40000"/>
+                            <a:lumOff val="60000"/>
+                          </a:schemeClr>
+                        </a:gs>
+                        <a:gs pos="46000">
+                          <a:schemeClr val="accent1">
+                            <a:lumMod val="95000"/>
+                            <a:lumOff val="5000"/>
+                          </a:schemeClr>
+                        </a:gs>
+                        <a:gs pos="100000">
+                          <a:schemeClr val="accent1">
+                            <a:lumMod val="60000"/>
+                          </a:schemeClr>
+                        </a:gs>
+                      </a:gsLst>
+                      <a:path path="circle">
+                        <a:fillToRect l="50000" t="130000" r="50000" b="-30000"/>
+                      </a:path>
+                      <a:tileRect/>
+                    </a:gradFill>
+                  </a:tcPr>
                 </a:tc>
                 <a:tc>
                   <a:txBody>
@@ -14242,7 +16038,33 @@
                       <a:endParaRPr lang="it-IT" dirty="0"/>
                     </a:p>
                   </a:txBody>
-                  <a:tcPr/>
+                  <a:tcPr>
+                    <a:gradFill flip="none" rotWithShape="1">
+                      <a:gsLst>
+                        <a:gs pos="0">
+                          <a:schemeClr val="accent1">
+                            <a:lumMod val="40000"/>
+                            <a:lumOff val="60000"/>
+                          </a:schemeClr>
+                        </a:gs>
+                        <a:gs pos="46000">
+                          <a:schemeClr val="accent1">
+                            <a:lumMod val="95000"/>
+                            <a:lumOff val="5000"/>
+                          </a:schemeClr>
+                        </a:gs>
+                        <a:gs pos="100000">
+                          <a:schemeClr val="accent1">
+                            <a:lumMod val="60000"/>
+                          </a:schemeClr>
+                        </a:gs>
+                      </a:gsLst>
+                      <a:path path="circle">
+                        <a:fillToRect l="50000" t="130000" r="50000" b="-30000"/>
+                      </a:path>
+                      <a:tileRect/>
+                    </a:gradFill>
+                  </a:tcPr>
                 </a:tc>
                 <a:tc>
                   <a:txBody>
@@ -14273,7 +16095,33 @@
                       <a:endParaRPr lang="it-IT" dirty="0"/>
                     </a:p>
                   </a:txBody>
-                  <a:tcPr/>
+                  <a:tcPr>
+                    <a:gradFill flip="none" rotWithShape="1">
+                      <a:gsLst>
+                        <a:gs pos="0">
+                          <a:schemeClr val="accent1">
+                            <a:lumMod val="40000"/>
+                            <a:lumOff val="60000"/>
+                          </a:schemeClr>
+                        </a:gs>
+                        <a:gs pos="46000">
+                          <a:schemeClr val="accent1">
+                            <a:lumMod val="95000"/>
+                            <a:lumOff val="5000"/>
+                          </a:schemeClr>
+                        </a:gs>
+                        <a:gs pos="100000">
+                          <a:schemeClr val="accent1">
+                            <a:lumMod val="60000"/>
+                          </a:schemeClr>
+                        </a:gs>
+                      </a:gsLst>
+                      <a:path path="circle">
+                        <a:fillToRect l="50000" t="130000" r="50000" b="-30000"/>
+                      </a:path>
+                      <a:tileRect/>
+                    </a:gradFill>
+                  </a:tcPr>
                 </a:tc>
                 <a:extLst>
                   <a:ext uri="{0D108BD9-81ED-4DB2-BD59-A6C34878D82A}">
@@ -14311,7 +16159,33 @@
                       <a:endParaRPr lang="it-IT" dirty="0"/>
                     </a:p>
                   </a:txBody>
-                  <a:tcPr/>
+                  <a:tcPr>
+                    <a:gradFill flip="none" rotWithShape="1">
+                      <a:gsLst>
+                        <a:gs pos="0">
+                          <a:schemeClr val="accent1">
+                            <a:lumMod val="40000"/>
+                            <a:lumOff val="60000"/>
+                          </a:schemeClr>
+                        </a:gs>
+                        <a:gs pos="46000">
+                          <a:schemeClr val="accent1">
+                            <a:lumMod val="95000"/>
+                            <a:lumOff val="5000"/>
+                          </a:schemeClr>
+                        </a:gs>
+                        <a:gs pos="100000">
+                          <a:schemeClr val="accent1">
+                            <a:lumMod val="60000"/>
+                          </a:schemeClr>
+                        </a:gs>
+                      </a:gsLst>
+                      <a:path path="circle">
+                        <a:fillToRect l="50000" t="130000" r="50000" b="-30000"/>
+                      </a:path>
+                      <a:tileRect/>
+                    </a:gradFill>
+                  </a:tcPr>
                 </a:tc>
                 <a:tc>
                   <a:txBody>
@@ -14325,7 +16199,33 @@
                       <a:endParaRPr lang="it-IT" dirty="0"/>
                     </a:p>
                   </a:txBody>
-                  <a:tcPr/>
+                  <a:tcPr>
+                    <a:gradFill flip="none" rotWithShape="1">
+                      <a:gsLst>
+                        <a:gs pos="0">
+                          <a:schemeClr val="accent1">
+                            <a:lumMod val="40000"/>
+                            <a:lumOff val="60000"/>
+                          </a:schemeClr>
+                        </a:gs>
+                        <a:gs pos="46000">
+                          <a:schemeClr val="accent1">
+                            <a:lumMod val="95000"/>
+                            <a:lumOff val="5000"/>
+                          </a:schemeClr>
+                        </a:gs>
+                        <a:gs pos="100000">
+                          <a:schemeClr val="accent1">
+                            <a:lumMod val="60000"/>
+                          </a:schemeClr>
+                        </a:gs>
+                      </a:gsLst>
+                      <a:path path="circle">
+                        <a:fillToRect l="50000" t="130000" r="50000" b="-30000"/>
+                      </a:path>
+                      <a:tileRect/>
+                    </a:gradFill>
+                  </a:tcPr>
                 </a:tc>
                 <a:tc>
                   <a:txBody>
@@ -14339,7 +16239,33 @@
                       <a:endParaRPr lang="it-IT" dirty="0"/>
                     </a:p>
                   </a:txBody>
-                  <a:tcPr/>
+                  <a:tcPr>
+                    <a:gradFill flip="none" rotWithShape="1">
+                      <a:gsLst>
+                        <a:gs pos="0">
+                          <a:schemeClr val="accent1">
+                            <a:lumMod val="40000"/>
+                            <a:lumOff val="60000"/>
+                          </a:schemeClr>
+                        </a:gs>
+                        <a:gs pos="46000">
+                          <a:schemeClr val="accent1">
+                            <a:lumMod val="95000"/>
+                            <a:lumOff val="5000"/>
+                          </a:schemeClr>
+                        </a:gs>
+                        <a:gs pos="100000">
+                          <a:schemeClr val="accent1">
+                            <a:lumMod val="60000"/>
+                          </a:schemeClr>
+                        </a:gs>
+                      </a:gsLst>
+                      <a:path path="circle">
+                        <a:fillToRect l="50000" t="130000" r="50000" b="-30000"/>
+                      </a:path>
+                      <a:tileRect/>
+                    </a:gradFill>
+                  </a:tcPr>
                 </a:tc>
                 <a:tc>
                   <a:txBody>
@@ -14370,7 +16296,33 @@
                       <a:endParaRPr lang="it-IT" dirty="0"/>
                     </a:p>
                   </a:txBody>
-                  <a:tcPr/>
+                  <a:tcPr>
+                    <a:gradFill flip="none" rotWithShape="1">
+                      <a:gsLst>
+                        <a:gs pos="0">
+                          <a:schemeClr val="accent1">
+                            <a:lumMod val="40000"/>
+                            <a:lumOff val="60000"/>
+                          </a:schemeClr>
+                        </a:gs>
+                        <a:gs pos="46000">
+                          <a:schemeClr val="accent1">
+                            <a:lumMod val="95000"/>
+                            <a:lumOff val="5000"/>
+                          </a:schemeClr>
+                        </a:gs>
+                        <a:gs pos="100000">
+                          <a:schemeClr val="accent1">
+                            <a:lumMod val="60000"/>
+                          </a:schemeClr>
+                        </a:gs>
+                      </a:gsLst>
+                      <a:path path="circle">
+                        <a:fillToRect l="50000" t="130000" r="50000" b="-30000"/>
+                      </a:path>
+                      <a:tileRect/>
+                    </a:gradFill>
+                  </a:tcPr>
                 </a:tc>
                 <a:extLst>
                   <a:ext uri="{0D108BD9-81ED-4DB2-BD59-A6C34878D82A}">
@@ -14408,7 +16360,33 @@
                       <a:endParaRPr lang="it-IT" dirty="0"/>
                     </a:p>
                   </a:txBody>
-                  <a:tcPr/>
+                  <a:tcPr>
+                    <a:gradFill flip="none" rotWithShape="1">
+                      <a:gsLst>
+                        <a:gs pos="0">
+                          <a:schemeClr val="accent1">
+                            <a:lumMod val="40000"/>
+                            <a:lumOff val="60000"/>
+                          </a:schemeClr>
+                        </a:gs>
+                        <a:gs pos="46000">
+                          <a:schemeClr val="accent1">
+                            <a:lumMod val="95000"/>
+                            <a:lumOff val="5000"/>
+                          </a:schemeClr>
+                        </a:gs>
+                        <a:gs pos="100000">
+                          <a:schemeClr val="accent1">
+                            <a:lumMod val="60000"/>
+                          </a:schemeClr>
+                        </a:gs>
+                      </a:gsLst>
+                      <a:path path="circle">
+                        <a:fillToRect l="50000" t="130000" r="50000" b="-30000"/>
+                      </a:path>
+                      <a:tileRect/>
+                    </a:gradFill>
+                  </a:tcPr>
                 </a:tc>
                 <a:tc>
                   <a:txBody>
@@ -14439,7 +16417,33 @@
                       <a:endParaRPr lang="it-IT" dirty="0"/>
                     </a:p>
                   </a:txBody>
-                  <a:tcPr/>
+                  <a:tcPr>
+                    <a:gradFill flip="none" rotWithShape="1">
+                      <a:gsLst>
+                        <a:gs pos="0">
+                          <a:schemeClr val="accent1">
+                            <a:lumMod val="40000"/>
+                            <a:lumOff val="60000"/>
+                          </a:schemeClr>
+                        </a:gs>
+                        <a:gs pos="46000">
+                          <a:schemeClr val="accent1">
+                            <a:lumMod val="95000"/>
+                            <a:lumOff val="5000"/>
+                          </a:schemeClr>
+                        </a:gs>
+                        <a:gs pos="100000">
+                          <a:schemeClr val="accent1">
+                            <a:lumMod val="60000"/>
+                          </a:schemeClr>
+                        </a:gs>
+                      </a:gsLst>
+                      <a:path path="circle">
+                        <a:fillToRect l="50000" t="130000" r="50000" b="-30000"/>
+                      </a:path>
+                      <a:tileRect/>
+                    </a:gradFill>
+                  </a:tcPr>
                 </a:tc>
                 <a:tc>
                   <a:txBody>
@@ -14453,7 +16457,33 @@
                       <a:endParaRPr lang="it-IT" dirty="0"/>
                     </a:p>
                   </a:txBody>
-                  <a:tcPr/>
+                  <a:tcPr>
+                    <a:gradFill flip="none" rotWithShape="1">
+                      <a:gsLst>
+                        <a:gs pos="0">
+                          <a:schemeClr val="accent1">
+                            <a:lumMod val="40000"/>
+                            <a:lumOff val="60000"/>
+                          </a:schemeClr>
+                        </a:gs>
+                        <a:gs pos="46000">
+                          <a:schemeClr val="accent1">
+                            <a:lumMod val="95000"/>
+                            <a:lumOff val="5000"/>
+                          </a:schemeClr>
+                        </a:gs>
+                        <a:gs pos="100000">
+                          <a:schemeClr val="accent1">
+                            <a:lumMod val="60000"/>
+                          </a:schemeClr>
+                        </a:gs>
+                      </a:gsLst>
+                      <a:path path="circle">
+                        <a:fillToRect l="50000" t="130000" r="50000" b="-30000"/>
+                      </a:path>
+                      <a:tileRect/>
+                    </a:gradFill>
+                  </a:tcPr>
                 </a:tc>
                 <a:tc>
                   <a:txBody>
@@ -14484,7 +16514,33 @@
                       <a:endParaRPr lang="it-IT" dirty="0"/>
                     </a:p>
                   </a:txBody>
-                  <a:tcPr/>
+                  <a:tcPr>
+                    <a:gradFill flip="none" rotWithShape="1">
+                      <a:gsLst>
+                        <a:gs pos="0">
+                          <a:schemeClr val="accent1">
+                            <a:lumMod val="40000"/>
+                            <a:lumOff val="60000"/>
+                          </a:schemeClr>
+                        </a:gs>
+                        <a:gs pos="46000">
+                          <a:schemeClr val="accent1">
+                            <a:lumMod val="95000"/>
+                            <a:lumOff val="5000"/>
+                          </a:schemeClr>
+                        </a:gs>
+                        <a:gs pos="100000">
+                          <a:schemeClr val="accent1">
+                            <a:lumMod val="60000"/>
+                          </a:schemeClr>
+                        </a:gs>
+                      </a:gsLst>
+                      <a:path path="circle">
+                        <a:fillToRect l="50000" t="130000" r="50000" b="-30000"/>
+                      </a:path>
+                      <a:tileRect/>
+                    </a:gradFill>
+                  </a:tcPr>
                 </a:tc>
                 <a:extLst>
                   <a:ext uri="{0D108BD9-81ED-4DB2-BD59-A6C34878D82A}">
@@ -14522,7 +16578,33 @@
                       <a:endParaRPr lang="it-IT" dirty="0"/>
                     </a:p>
                   </a:txBody>
-                  <a:tcPr/>
+                  <a:tcPr>
+                    <a:gradFill flip="none" rotWithShape="1">
+                      <a:gsLst>
+                        <a:gs pos="0">
+                          <a:schemeClr val="accent1">
+                            <a:lumMod val="40000"/>
+                            <a:lumOff val="60000"/>
+                          </a:schemeClr>
+                        </a:gs>
+                        <a:gs pos="46000">
+                          <a:schemeClr val="accent1">
+                            <a:lumMod val="95000"/>
+                            <a:lumOff val="5000"/>
+                          </a:schemeClr>
+                        </a:gs>
+                        <a:gs pos="100000">
+                          <a:schemeClr val="accent1">
+                            <a:lumMod val="60000"/>
+                          </a:schemeClr>
+                        </a:gs>
+                      </a:gsLst>
+                      <a:path path="circle">
+                        <a:fillToRect l="50000" t="130000" r="50000" b="-30000"/>
+                      </a:path>
+                      <a:tileRect/>
+                    </a:gradFill>
+                  </a:tcPr>
                 </a:tc>
                 <a:tc>
                   <a:txBody>
@@ -14553,7 +16635,33 @@
                       <a:endParaRPr lang="it-IT" dirty="0"/>
                     </a:p>
                   </a:txBody>
-                  <a:tcPr/>
+                  <a:tcPr>
+                    <a:gradFill flip="none" rotWithShape="1">
+                      <a:gsLst>
+                        <a:gs pos="0">
+                          <a:schemeClr val="accent1">
+                            <a:lumMod val="40000"/>
+                            <a:lumOff val="60000"/>
+                          </a:schemeClr>
+                        </a:gs>
+                        <a:gs pos="46000">
+                          <a:schemeClr val="accent1">
+                            <a:lumMod val="95000"/>
+                            <a:lumOff val="5000"/>
+                          </a:schemeClr>
+                        </a:gs>
+                        <a:gs pos="100000">
+                          <a:schemeClr val="accent1">
+                            <a:lumMod val="60000"/>
+                          </a:schemeClr>
+                        </a:gs>
+                      </a:gsLst>
+                      <a:path path="circle">
+                        <a:fillToRect l="50000" t="130000" r="50000" b="-30000"/>
+                      </a:path>
+                      <a:tileRect/>
+                    </a:gradFill>
+                  </a:tcPr>
                 </a:tc>
                 <a:tc>
                   <a:txBody>
@@ -14567,7 +16675,33 @@
                       <a:endParaRPr lang="it-IT" dirty="0"/>
                     </a:p>
                   </a:txBody>
-                  <a:tcPr/>
+                  <a:tcPr>
+                    <a:gradFill flip="none" rotWithShape="1">
+                      <a:gsLst>
+                        <a:gs pos="0">
+                          <a:schemeClr val="accent1">
+                            <a:lumMod val="40000"/>
+                            <a:lumOff val="60000"/>
+                          </a:schemeClr>
+                        </a:gs>
+                        <a:gs pos="46000">
+                          <a:schemeClr val="accent1">
+                            <a:lumMod val="95000"/>
+                            <a:lumOff val="5000"/>
+                          </a:schemeClr>
+                        </a:gs>
+                        <a:gs pos="100000">
+                          <a:schemeClr val="accent1">
+                            <a:lumMod val="60000"/>
+                          </a:schemeClr>
+                        </a:gs>
+                      </a:gsLst>
+                      <a:path path="circle">
+                        <a:fillToRect l="50000" t="130000" r="50000" b="-30000"/>
+                      </a:path>
+                      <a:tileRect/>
+                    </a:gradFill>
+                  </a:tcPr>
                 </a:tc>
                 <a:tc>
                   <a:txBody>
@@ -14598,7 +16732,33 @@
                       <a:endParaRPr lang="it-IT" dirty="0"/>
                     </a:p>
                   </a:txBody>
-                  <a:tcPr/>
+                  <a:tcPr>
+                    <a:gradFill flip="none" rotWithShape="1">
+                      <a:gsLst>
+                        <a:gs pos="0">
+                          <a:schemeClr val="accent1">
+                            <a:lumMod val="40000"/>
+                            <a:lumOff val="60000"/>
+                          </a:schemeClr>
+                        </a:gs>
+                        <a:gs pos="46000">
+                          <a:schemeClr val="accent1">
+                            <a:lumMod val="95000"/>
+                            <a:lumOff val="5000"/>
+                          </a:schemeClr>
+                        </a:gs>
+                        <a:gs pos="100000">
+                          <a:schemeClr val="accent1">
+                            <a:lumMod val="60000"/>
+                          </a:schemeClr>
+                        </a:gs>
+                      </a:gsLst>
+                      <a:path path="circle">
+                        <a:fillToRect l="50000" t="130000" r="50000" b="-30000"/>
+                      </a:path>
+                      <a:tileRect/>
+                    </a:gradFill>
+                  </a:tcPr>
                 </a:tc>
                 <a:extLst>
                   <a:ext uri="{0D108BD9-81ED-4DB2-BD59-A6C34878D82A}">
@@ -14636,7 +16796,33 @@
                       <a:endParaRPr lang="it-IT" dirty="0"/>
                     </a:p>
                   </a:txBody>
-                  <a:tcPr/>
+                  <a:tcPr>
+                    <a:gradFill flip="none" rotWithShape="1">
+                      <a:gsLst>
+                        <a:gs pos="0">
+                          <a:schemeClr val="accent1">
+                            <a:lumMod val="40000"/>
+                            <a:lumOff val="60000"/>
+                          </a:schemeClr>
+                        </a:gs>
+                        <a:gs pos="46000">
+                          <a:schemeClr val="accent1">
+                            <a:lumMod val="95000"/>
+                            <a:lumOff val="5000"/>
+                          </a:schemeClr>
+                        </a:gs>
+                        <a:gs pos="100000">
+                          <a:schemeClr val="accent1">
+                            <a:lumMod val="60000"/>
+                          </a:schemeClr>
+                        </a:gs>
+                      </a:gsLst>
+                      <a:path path="circle">
+                        <a:fillToRect l="50000" t="130000" r="50000" b="-30000"/>
+                      </a:path>
+                      <a:tileRect/>
+                    </a:gradFill>
+                  </a:tcPr>
                 </a:tc>
                 <a:tc>
                   <a:txBody>
@@ -14650,7 +16836,33 @@
                       <a:endParaRPr lang="it-IT" dirty="0"/>
                     </a:p>
                   </a:txBody>
-                  <a:tcPr/>
+                  <a:tcPr>
+                    <a:gradFill flip="none" rotWithShape="1">
+                      <a:gsLst>
+                        <a:gs pos="0">
+                          <a:schemeClr val="accent1">
+                            <a:lumMod val="40000"/>
+                            <a:lumOff val="60000"/>
+                          </a:schemeClr>
+                        </a:gs>
+                        <a:gs pos="46000">
+                          <a:schemeClr val="accent1">
+                            <a:lumMod val="95000"/>
+                            <a:lumOff val="5000"/>
+                          </a:schemeClr>
+                        </a:gs>
+                        <a:gs pos="100000">
+                          <a:schemeClr val="accent1">
+                            <a:lumMod val="60000"/>
+                          </a:schemeClr>
+                        </a:gs>
+                      </a:gsLst>
+                      <a:path path="circle">
+                        <a:fillToRect l="50000" t="130000" r="50000" b="-30000"/>
+                      </a:path>
+                      <a:tileRect/>
+                    </a:gradFill>
+                  </a:tcPr>
                 </a:tc>
                 <a:tc>
                   <a:txBody>
@@ -14664,7 +16876,33 @@
                       <a:endParaRPr lang="it-IT" dirty="0"/>
                     </a:p>
                   </a:txBody>
-                  <a:tcPr/>
+                  <a:tcPr>
+                    <a:gradFill flip="none" rotWithShape="1">
+                      <a:gsLst>
+                        <a:gs pos="0">
+                          <a:schemeClr val="accent1">
+                            <a:lumMod val="40000"/>
+                            <a:lumOff val="60000"/>
+                          </a:schemeClr>
+                        </a:gs>
+                        <a:gs pos="46000">
+                          <a:schemeClr val="accent1">
+                            <a:lumMod val="95000"/>
+                            <a:lumOff val="5000"/>
+                          </a:schemeClr>
+                        </a:gs>
+                        <a:gs pos="100000">
+                          <a:schemeClr val="accent1">
+                            <a:lumMod val="60000"/>
+                          </a:schemeClr>
+                        </a:gs>
+                      </a:gsLst>
+                      <a:path path="circle">
+                        <a:fillToRect l="50000" t="130000" r="50000" b="-30000"/>
+                      </a:path>
+                      <a:tileRect/>
+                    </a:gradFill>
+                  </a:tcPr>
                 </a:tc>
                 <a:tc>
                   <a:txBody>
@@ -14695,7 +16933,33 @@
                       <a:endParaRPr lang="it-IT" dirty="0"/>
                     </a:p>
                   </a:txBody>
-                  <a:tcPr/>
+                  <a:tcPr>
+                    <a:gradFill flip="none" rotWithShape="1">
+                      <a:gsLst>
+                        <a:gs pos="0">
+                          <a:schemeClr val="accent1">
+                            <a:lumMod val="40000"/>
+                            <a:lumOff val="60000"/>
+                          </a:schemeClr>
+                        </a:gs>
+                        <a:gs pos="46000">
+                          <a:schemeClr val="accent1">
+                            <a:lumMod val="95000"/>
+                            <a:lumOff val="5000"/>
+                          </a:schemeClr>
+                        </a:gs>
+                        <a:gs pos="100000">
+                          <a:schemeClr val="accent1">
+                            <a:lumMod val="60000"/>
+                          </a:schemeClr>
+                        </a:gs>
+                      </a:gsLst>
+                      <a:path path="circle">
+                        <a:fillToRect l="50000" t="130000" r="50000" b="-30000"/>
+                      </a:path>
+                      <a:tileRect/>
+                    </a:gradFill>
+                  </a:tcPr>
                 </a:tc>
                 <a:extLst>
                   <a:ext uri="{0D108BD9-81ED-4DB2-BD59-A6C34878D82A}">
@@ -14733,7 +16997,33 @@
                       <a:endParaRPr lang="it-IT" dirty="0"/>
                     </a:p>
                   </a:txBody>
-                  <a:tcPr/>
+                  <a:tcPr>
+                    <a:gradFill flip="none" rotWithShape="1">
+                      <a:gsLst>
+                        <a:gs pos="0">
+                          <a:schemeClr val="accent1">
+                            <a:lumMod val="40000"/>
+                            <a:lumOff val="60000"/>
+                          </a:schemeClr>
+                        </a:gs>
+                        <a:gs pos="46000">
+                          <a:schemeClr val="accent1">
+                            <a:lumMod val="95000"/>
+                            <a:lumOff val="5000"/>
+                          </a:schemeClr>
+                        </a:gs>
+                        <a:gs pos="100000">
+                          <a:schemeClr val="accent1">
+                            <a:lumMod val="60000"/>
+                          </a:schemeClr>
+                        </a:gs>
+                      </a:gsLst>
+                      <a:path path="circle">
+                        <a:fillToRect l="50000" t="130000" r="50000" b="-30000"/>
+                      </a:path>
+                      <a:tileRect/>
+                    </a:gradFill>
+                  </a:tcPr>
                 </a:tc>
                 <a:tc>
                   <a:txBody>
@@ -14764,7 +17054,33 @@
                       <a:endParaRPr lang="it-IT" dirty="0"/>
                     </a:p>
                   </a:txBody>
-                  <a:tcPr/>
+                  <a:tcPr>
+                    <a:gradFill flip="none" rotWithShape="1">
+                      <a:gsLst>
+                        <a:gs pos="0">
+                          <a:schemeClr val="accent1">
+                            <a:lumMod val="40000"/>
+                            <a:lumOff val="60000"/>
+                          </a:schemeClr>
+                        </a:gs>
+                        <a:gs pos="46000">
+                          <a:schemeClr val="accent1">
+                            <a:lumMod val="95000"/>
+                            <a:lumOff val="5000"/>
+                          </a:schemeClr>
+                        </a:gs>
+                        <a:gs pos="100000">
+                          <a:schemeClr val="accent1">
+                            <a:lumMod val="60000"/>
+                          </a:schemeClr>
+                        </a:gs>
+                      </a:gsLst>
+                      <a:path path="circle">
+                        <a:fillToRect l="50000" t="130000" r="50000" b="-30000"/>
+                      </a:path>
+                      <a:tileRect/>
+                    </a:gradFill>
+                  </a:tcPr>
                 </a:tc>
                 <a:tc>
                   <a:txBody>
@@ -14778,7 +17094,33 @@
                       <a:endParaRPr lang="it-IT" dirty="0"/>
                     </a:p>
                   </a:txBody>
-                  <a:tcPr/>
+                  <a:tcPr>
+                    <a:gradFill flip="none" rotWithShape="1">
+                      <a:gsLst>
+                        <a:gs pos="0">
+                          <a:schemeClr val="accent1">
+                            <a:lumMod val="40000"/>
+                            <a:lumOff val="60000"/>
+                          </a:schemeClr>
+                        </a:gs>
+                        <a:gs pos="46000">
+                          <a:schemeClr val="accent1">
+                            <a:lumMod val="95000"/>
+                            <a:lumOff val="5000"/>
+                          </a:schemeClr>
+                        </a:gs>
+                        <a:gs pos="100000">
+                          <a:schemeClr val="accent1">
+                            <a:lumMod val="60000"/>
+                          </a:schemeClr>
+                        </a:gs>
+                      </a:gsLst>
+                      <a:path path="circle">
+                        <a:fillToRect l="50000" t="130000" r="50000" b="-30000"/>
+                      </a:path>
+                      <a:tileRect/>
+                    </a:gradFill>
+                  </a:tcPr>
                 </a:tc>
                 <a:tc>
                   <a:txBody>
@@ -14809,7 +17151,33 @@
                       <a:endParaRPr lang="it-IT" dirty="0"/>
                     </a:p>
                   </a:txBody>
-                  <a:tcPr/>
+                  <a:tcPr>
+                    <a:gradFill flip="none" rotWithShape="1">
+                      <a:gsLst>
+                        <a:gs pos="0">
+                          <a:schemeClr val="accent1">
+                            <a:lumMod val="40000"/>
+                            <a:lumOff val="60000"/>
+                          </a:schemeClr>
+                        </a:gs>
+                        <a:gs pos="46000">
+                          <a:schemeClr val="accent1">
+                            <a:lumMod val="95000"/>
+                            <a:lumOff val="5000"/>
+                          </a:schemeClr>
+                        </a:gs>
+                        <a:gs pos="100000">
+                          <a:schemeClr val="accent1">
+                            <a:lumMod val="60000"/>
+                          </a:schemeClr>
+                        </a:gs>
+                      </a:gsLst>
+                      <a:path path="circle">
+                        <a:fillToRect l="50000" t="130000" r="50000" b="-30000"/>
+                      </a:path>
+                      <a:tileRect/>
+                    </a:gradFill>
+                  </a:tcPr>
                 </a:tc>
                 <a:extLst>
                   <a:ext uri="{0D108BD9-81ED-4DB2-BD59-A6C34878D82A}">
@@ -14847,7 +17215,33 @@
                       <a:endParaRPr lang="it-IT" dirty="0"/>
                     </a:p>
                   </a:txBody>
-                  <a:tcPr/>
+                  <a:tcPr>
+                    <a:gradFill flip="none" rotWithShape="1">
+                      <a:gsLst>
+                        <a:gs pos="0">
+                          <a:schemeClr val="accent1">
+                            <a:lumMod val="40000"/>
+                            <a:lumOff val="60000"/>
+                          </a:schemeClr>
+                        </a:gs>
+                        <a:gs pos="46000">
+                          <a:schemeClr val="accent1">
+                            <a:lumMod val="95000"/>
+                            <a:lumOff val="5000"/>
+                          </a:schemeClr>
+                        </a:gs>
+                        <a:gs pos="100000">
+                          <a:schemeClr val="accent1">
+                            <a:lumMod val="60000"/>
+                          </a:schemeClr>
+                        </a:gs>
+                      </a:gsLst>
+                      <a:path path="circle">
+                        <a:fillToRect l="50000" t="130000" r="50000" b="-30000"/>
+                      </a:path>
+                      <a:tileRect/>
+                    </a:gradFill>
+                  </a:tcPr>
                 </a:tc>
                 <a:tc>
                   <a:txBody>
@@ -14878,7 +17272,33 @@
                       <a:endParaRPr lang="it-IT" dirty="0"/>
                     </a:p>
                   </a:txBody>
-                  <a:tcPr/>
+                  <a:tcPr>
+                    <a:gradFill flip="none" rotWithShape="1">
+                      <a:gsLst>
+                        <a:gs pos="0">
+                          <a:schemeClr val="accent1">
+                            <a:lumMod val="40000"/>
+                            <a:lumOff val="60000"/>
+                          </a:schemeClr>
+                        </a:gs>
+                        <a:gs pos="46000">
+                          <a:schemeClr val="accent1">
+                            <a:lumMod val="95000"/>
+                            <a:lumOff val="5000"/>
+                          </a:schemeClr>
+                        </a:gs>
+                        <a:gs pos="100000">
+                          <a:schemeClr val="accent1">
+                            <a:lumMod val="60000"/>
+                          </a:schemeClr>
+                        </a:gs>
+                      </a:gsLst>
+                      <a:path path="circle">
+                        <a:fillToRect l="50000" t="130000" r="50000" b="-30000"/>
+                      </a:path>
+                      <a:tileRect/>
+                    </a:gradFill>
+                  </a:tcPr>
                 </a:tc>
                 <a:tc>
                   <a:txBody>
@@ -14892,7 +17312,33 @@
                       <a:endParaRPr lang="it-IT" dirty="0"/>
                     </a:p>
                   </a:txBody>
-                  <a:tcPr/>
+                  <a:tcPr>
+                    <a:gradFill flip="none" rotWithShape="1">
+                      <a:gsLst>
+                        <a:gs pos="0">
+                          <a:schemeClr val="accent1">
+                            <a:lumMod val="40000"/>
+                            <a:lumOff val="60000"/>
+                          </a:schemeClr>
+                        </a:gs>
+                        <a:gs pos="46000">
+                          <a:schemeClr val="accent1">
+                            <a:lumMod val="95000"/>
+                            <a:lumOff val="5000"/>
+                          </a:schemeClr>
+                        </a:gs>
+                        <a:gs pos="100000">
+                          <a:schemeClr val="accent1">
+                            <a:lumMod val="60000"/>
+                          </a:schemeClr>
+                        </a:gs>
+                      </a:gsLst>
+                      <a:path path="circle">
+                        <a:fillToRect l="50000" t="130000" r="50000" b="-30000"/>
+                      </a:path>
+                      <a:tileRect/>
+                    </a:gradFill>
+                  </a:tcPr>
                 </a:tc>
                 <a:tc>
                   <a:txBody>
@@ -14923,7 +17369,33 @@
                       <a:endParaRPr lang="it-IT" dirty="0"/>
                     </a:p>
                   </a:txBody>
-                  <a:tcPr/>
+                  <a:tcPr>
+                    <a:gradFill flip="none" rotWithShape="1">
+                      <a:gsLst>
+                        <a:gs pos="0">
+                          <a:schemeClr val="accent1">
+                            <a:lumMod val="40000"/>
+                            <a:lumOff val="60000"/>
+                          </a:schemeClr>
+                        </a:gs>
+                        <a:gs pos="46000">
+                          <a:schemeClr val="accent1">
+                            <a:lumMod val="95000"/>
+                            <a:lumOff val="5000"/>
+                          </a:schemeClr>
+                        </a:gs>
+                        <a:gs pos="100000">
+                          <a:schemeClr val="accent1">
+                            <a:lumMod val="60000"/>
+                          </a:schemeClr>
+                        </a:gs>
+                      </a:gsLst>
+                      <a:path path="circle">
+                        <a:fillToRect l="50000" t="130000" r="50000" b="-30000"/>
+                      </a:path>
+                      <a:tileRect/>
+                    </a:gradFill>
+                  </a:tcPr>
                 </a:tc>
                 <a:extLst>
                   <a:ext uri="{0D108BD9-81ED-4DB2-BD59-A6C34878D82A}">
@@ -14961,7 +17433,33 @@
                       <a:endParaRPr lang="it-IT" dirty="0"/>
                     </a:p>
                   </a:txBody>
-                  <a:tcPr/>
+                  <a:tcPr>
+                    <a:gradFill flip="none" rotWithShape="1">
+                      <a:gsLst>
+                        <a:gs pos="0">
+                          <a:schemeClr val="accent1">
+                            <a:lumMod val="40000"/>
+                            <a:lumOff val="60000"/>
+                          </a:schemeClr>
+                        </a:gs>
+                        <a:gs pos="46000">
+                          <a:schemeClr val="accent1">
+                            <a:lumMod val="95000"/>
+                            <a:lumOff val="5000"/>
+                          </a:schemeClr>
+                        </a:gs>
+                        <a:gs pos="100000">
+                          <a:schemeClr val="accent1">
+                            <a:lumMod val="60000"/>
+                          </a:schemeClr>
+                        </a:gs>
+                      </a:gsLst>
+                      <a:path path="circle">
+                        <a:fillToRect l="50000" t="130000" r="50000" b="-30000"/>
+                      </a:path>
+                      <a:tileRect/>
+                    </a:gradFill>
+                  </a:tcPr>
                 </a:tc>
                 <a:tc>
                   <a:txBody>
@@ -14992,7 +17490,33 @@
                       <a:endParaRPr lang="it-IT" dirty="0"/>
                     </a:p>
                   </a:txBody>
-                  <a:tcPr/>
+                  <a:tcPr>
+                    <a:gradFill flip="none" rotWithShape="1">
+                      <a:gsLst>
+                        <a:gs pos="0">
+                          <a:schemeClr val="accent1">
+                            <a:lumMod val="40000"/>
+                            <a:lumOff val="60000"/>
+                          </a:schemeClr>
+                        </a:gs>
+                        <a:gs pos="46000">
+                          <a:schemeClr val="accent1">
+                            <a:lumMod val="95000"/>
+                            <a:lumOff val="5000"/>
+                          </a:schemeClr>
+                        </a:gs>
+                        <a:gs pos="100000">
+                          <a:schemeClr val="accent1">
+                            <a:lumMod val="60000"/>
+                          </a:schemeClr>
+                        </a:gs>
+                      </a:gsLst>
+                      <a:path path="circle">
+                        <a:fillToRect l="50000" t="130000" r="50000" b="-30000"/>
+                      </a:path>
+                      <a:tileRect/>
+                    </a:gradFill>
+                  </a:tcPr>
                 </a:tc>
                 <a:tc>
                   <a:txBody>
@@ -15006,7 +17530,33 @@
                       <a:endParaRPr lang="it-IT" dirty="0"/>
                     </a:p>
                   </a:txBody>
-                  <a:tcPr/>
+                  <a:tcPr>
+                    <a:gradFill flip="none" rotWithShape="1">
+                      <a:gsLst>
+                        <a:gs pos="0">
+                          <a:schemeClr val="accent1">
+                            <a:lumMod val="40000"/>
+                            <a:lumOff val="60000"/>
+                          </a:schemeClr>
+                        </a:gs>
+                        <a:gs pos="46000">
+                          <a:schemeClr val="accent1">
+                            <a:lumMod val="95000"/>
+                            <a:lumOff val="5000"/>
+                          </a:schemeClr>
+                        </a:gs>
+                        <a:gs pos="100000">
+                          <a:schemeClr val="accent1">
+                            <a:lumMod val="60000"/>
+                          </a:schemeClr>
+                        </a:gs>
+                      </a:gsLst>
+                      <a:path path="circle">
+                        <a:fillToRect l="50000" t="130000" r="50000" b="-30000"/>
+                      </a:path>
+                      <a:tileRect/>
+                    </a:gradFill>
+                  </a:tcPr>
                 </a:tc>
                 <a:tc>
                   <a:txBody>
@@ -15020,7 +17570,33 @@
                       <a:endParaRPr lang="it-IT" dirty="0"/>
                     </a:p>
                   </a:txBody>
-                  <a:tcPr/>
+                  <a:tcPr>
+                    <a:gradFill flip="none" rotWithShape="1">
+                      <a:gsLst>
+                        <a:gs pos="0">
+                          <a:schemeClr val="accent1">
+                            <a:lumMod val="40000"/>
+                            <a:lumOff val="60000"/>
+                          </a:schemeClr>
+                        </a:gs>
+                        <a:gs pos="46000">
+                          <a:schemeClr val="accent1">
+                            <a:lumMod val="95000"/>
+                            <a:lumOff val="5000"/>
+                          </a:schemeClr>
+                        </a:gs>
+                        <a:gs pos="100000">
+                          <a:schemeClr val="accent1">
+                            <a:lumMod val="60000"/>
+                          </a:schemeClr>
+                        </a:gs>
+                      </a:gsLst>
+                      <a:path path="circle">
+                        <a:fillToRect l="50000" t="130000" r="50000" b="-30000"/>
+                      </a:path>
+                      <a:tileRect/>
+                    </a:gradFill>
+                  </a:tcPr>
                 </a:tc>
                 <a:extLst>
                   <a:ext uri="{0D108BD9-81ED-4DB2-BD59-A6C34878D82A}">

</xml_diff>